<commit_message>
minor modifications in the text
git-svn-id: file://localhost/tmp/svn2git/svn@240 defb5e50-622e-49ec-a68e-d72c7db87b45
</commit_message>
<xml_diff>
--- a/papers/cybertools08_poster/poster.pptx
+++ b/papers/cybertools08_poster/poster.pptx
@@ -223,7 +223,7 @@
             <a:fld id="{A60BDE4C-1E47-4343-BCB3-7EC161DBAAFD}" type="datetimeFigureOut">
               <a:rPr lang="en-US" smtClean="0"/>
               <a:pPr/>
-              <a:t>8/20/08</a:t>
+              <a:t>8/21/08</a:t>
             </a:fld>
             <a:endParaRPr lang="en-US"/>
           </a:p>
@@ -4193,10 +4193,10 @@
                   </a:outerShdw>
                 </a:effectLst>
               </a:rPr>
-              <a:t>,</a:t>
-            </a:r>
-            <a:r>
-              <a:rPr lang="en-US" altLang="zh-TW" sz="4800" b="1" dirty="0" smtClean="0">
+              <a:t>, </a:t>
+            </a:r>
+            <a:r>
+              <a:rPr lang="en-US" altLang="zh-TW" sz="4800" b="1" dirty="0" err="1" smtClean="0">
                 <a:solidFill>
                   <a:schemeClr val="bg1"/>
                 </a:solidFill>
@@ -4206,10 +4206,10 @@
                   </a:outerShdw>
                 </a:effectLst>
               </a:rPr>
-              <a:t> </a:t>
-            </a:r>
-            <a:r>
-              <a:rPr lang="en-US" altLang="zh-TW" sz="4800" b="1" dirty="0" err="1" smtClean="0">
+              <a:t>Hartmut</a:t>
+            </a:r>
+            <a:r>
+              <a:rPr lang="en-US" altLang="zh-TW" sz="4800" b="1" dirty="0" smtClean="0">
                 <a:solidFill>
                   <a:schemeClr val="bg1"/>
                 </a:solidFill>
@@ -4219,10 +4219,10 @@
                   </a:outerShdw>
                 </a:effectLst>
               </a:rPr>
-              <a:t>Hartmut</a:t>
-            </a:r>
-            <a:r>
-              <a:rPr lang="en-US" altLang="zh-TW" sz="4800" b="1" dirty="0" smtClean="0">
+              <a:t> Kaiser, </a:t>
+            </a:r>
+            <a:r>
+              <a:rPr lang="en-US" altLang="zh-TW" sz="4800" b="1" dirty="0" err="1" smtClean="0">
                 <a:solidFill>
                   <a:schemeClr val="bg1"/>
                 </a:solidFill>
@@ -4232,10 +4232,10 @@
                   </a:outerShdw>
                 </a:effectLst>
               </a:rPr>
-              <a:t> Kaiser, </a:t>
-            </a:r>
-            <a:r>
-              <a:rPr lang="en-US" altLang="zh-TW" sz="4800" b="1" dirty="0" err="1" smtClean="0">
+              <a:t>Joohyun</a:t>
+            </a:r>
+            <a:r>
+              <a:rPr lang="en-US" altLang="zh-TW" sz="4800" b="1" dirty="0" smtClean="0">
                 <a:solidFill>
                   <a:schemeClr val="bg1"/>
                 </a:solidFill>
@@ -4245,10 +4245,10 @@
                   </a:outerShdw>
                 </a:effectLst>
               </a:rPr>
-              <a:t>Joohyun</a:t>
-            </a:r>
-            <a:r>
-              <a:rPr lang="en-US" altLang="zh-TW" sz="4800" b="1" dirty="0" smtClean="0">
+              <a:t> Kim, André </a:t>
+            </a:r>
+            <a:r>
+              <a:rPr lang="en-US" altLang="zh-TW" sz="4800" b="1" dirty="0" err="1" smtClean="0">
                 <a:solidFill>
                   <a:schemeClr val="bg1"/>
                 </a:solidFill>
@@ -4258,7 +4258,7 @@
                   </a:outerShdw>
                 </a:effectLst>
               </a:rPr>
-              <a:t> </a:t>
+              <a:t>Merzky</a:t>
             </a:r>
             <a:r>
               <a:rPr lang="en-US" altLang="zh-TW" sz="4800" b="1" dirty="0" smtClean="0">
@@ -4271,10 +4271,10 @@
                   </a:outerShdw>
                 </a:effectLst>
               </a:rPr>
-              <a:t>Kim, André </a:t>
-            </a:r>
-            <a:r>
-              <a:rPr lang="en-US" altLang="zh-TW" sz="4800" b="1" dirty="0" err="1" smtClean="0">
+              <a:t>, and Ole Weidner</a:t>
+            </a:r>
+            <a:r>
+              <a:rPr lang="en-US" altLang="zh-TW" sz="4800" b="1" baseline="30000" dirty="0" smtClean="0">
                 <a:solidFill>
                   <a:schemeClr val="bg1"/>
                 </a:solidFill>
@@ -4284,10 +4284,10 @@
                   </a:outerShdw>
                 </a:effectLst>
               </a:rPr>
-              <a:t>Merzky</a:t>
-            </a:r>
-            <a:r>
-              <a:rPr lang="en-US" altLang="zh-TW" sz="4800" b="1" dirty="0" smtClean="0">
+              <a:t/>
+            </a:r>
+            <a:br>
+              <a:rPr lang="en-US" altLang="zh-TW" sz="4800" b="1" baseline="30000" dirty="0" smtClean="0">
                 <a:solidFill>
                   <a:schemeClr val="bg1"/>
                 </a:solidFill>
@@ -4297,10 +4297,24 @@
                   </a:outerShdw>
                 </a:effectLst>
               </a:rPr>
-              <a:t>, and Ole Weidner</a:t>
-            </a:r>
-            <a:r>
-              <a:rPr lang="en-US" altLang="zh-TW" sz="4800" b="1" baseline="30000" dirty="0" smtClean="0">
+            </a:br>
+            <a:r>
+              <a:rPr lang="en-US" altLang="zh-TW" sz="1400" dirty="0" smtClean="0">
+                <a:solidFill>
+                  <a:schemeClr val="bg1"/>
+                </a:solidFill>
+              </a:rPr>
+              <a:t/>
+            </a:r>
+            <a:br>
+              <a:rPr lang="en-US" altLang="zh-TW" sz="1400" dirty="0" smtClean="0">
+                <a:solidFill>
+                  <a:schemeClr val="bg1"/>
+                </a:solidFill>
+              </a:rPr>
+            </a:br>
+            <a:r>
+              <a:rPr lang="en-US" altLang="zh-TW" sz="3600" b="1" dirty="0" smtClean="0">
                 <a:solidFill>
                   <a:schemeClr val="bg1"/>
                 </a:solidFill>
@@ -4310,10 +4324,10 @@
                   </a:outerShdw>
                 </a:effectLst>
               </a:rPr>
-              <a:t/>
+              <a:t>Center for Computation &amp; Technology, Louisiana State University, Baton Rouge, U.S.A.</a:t>
             </a:r>
             <a:br>
-              <a:rPr lang="en-US" altLang="zh-TW" sz="4800" b="1" baseline="30000" dirty="0" smtClean="0">
+              <a:rPr lang="en-US" altLang="zh-TW" sz="3600" b="1" dirty="0" smtClean="0">
                 <a:solidFill>
                   <a:schemeClr val="bg1"/>
                 </a:solidFill>
@@ -4324,46 +4338,6 @@
                 </a:effectLst>
               </a:rPr>
             </a:br>
-            <a:r>
-              <a:rPr lang="en-US" altLang="zh-TW" sz="1400" dirty="0" smtClean="0">
-                <a:solidFill>
-                  <a:schemeClr val="bg1"/>
-                </a:solidFill>
-              </a:rPr>
-              <a:t/>
-            </a:r>
-            <a:br>
-              <a:rPr lang="en-US" altLang="zh-TW" sz="1400" dirty="0" smtClean="0">
-                <a:solidFill>
-                  <a:schemeClr val="bg1"/>
-                </a:solidFill>
-              </a:rPr>
-            </a:br>
-            <a:r>
-              <a:rPr lang="en-US" altLang="zh-TW" sz="3600" b="1" dirty="0" smtClean="0">
-                <a:solidFill>
-                  <a:schemeClr val="bg1"/>
-                </a:solidFill>
-                <a:effectLst>
-                  <a:outerShdw blurRad="38100" dist="38100" dir="2700000" algn="tl">
-                    <a:srgbClr val="000000"/>
-                  </a:outerShdw>
-                </a:effectLst>
-              </a:rPr>
-              <a:t>Center for Computation &amp; Technology, Louisiana State University, Baton Rouge, U.S.A.</a:t>
-            </a:r>
-            <a:br>
-              <a:rPr lang="en-US" altLang="zh-TW" sz="3600" b="1" dirty="0" smtClean="0">
-                <a:solidFill>
-                  <a:schemeClr val="bg1"/>
-                </a:solidFill>
-                <a:effectLst>
-                  <a:outerShdw blurRad="38100" dist="38100" dir="2700000" algn="tl">
-                    <a:srgbClr val="000000"/>
-                  </a:outerShdw>
-                </a:effectLst>
-              </a:rPr>
-            </a:br>
             <a:endParaRPr lang="en-US" altLang="zh-TW" sz="5500" dirty="0" smtClean="0"/>
           </a:p>
         </p:txBody>
@@ -4379,7 +4353,7 @@
         <p:spPr bwMode="auto">
           <a:xfrm>
             <a:off x="897388" y="4968870"/>
-            <a:ext cx="13716000" cy="12224620"/>
+            <a:ext cx="13716000" cy="11271168"/>
           </a:xfrm>
           <a:prstGeom prst="roundRect">
             <a:avLst>
@@ -4413,11 +4387,6 @@
               </a:rPr>
               <a:t>Abstract</a:t>
             </a:r>
-            <a:endParaRPr lang="en-US" sz="5400" b="1" dirty="0" smtClean="0">
-              <a:solidFill>
-                <a:srgbClr val="000099"/>
-              </a:solidFill>
-            </a:endParaRPr>
           </a:p>
           <a:p>
             <a:pPr algn="ctr"/>
@@ -4438,19 +4407,8 @@
                 <a:latin typeface="Georgia"/>
                 <a:cs typeface="Georgia"/>
               </a:rPr>
-              <a:t>The </a:t>
-            </a:r>
-            <a:r>
-              <a:rPr lang="en-US" sz="2800" dirty="0" smtClean="0">
-                <a:latin typeface="Georgia"/>
-                <a:cs typeface="Georgia"/>
-              </a:rPr>
-              <a:t>Simple API for Grid Applications (SAGA), a proposed recommendation of the Open Grid Forum (OGF), defines a high-level programmatic interface for developers of Distributed Applications [1]. The fundamental idea of SAGA is to lower the barrier for applications and application scientists to utilize distributed infrastructure. SAGA provides a simple, uniform, stable interface to the most often required functionality in order to construct general purpose, extensible and scalable applications.</a:t>
-            </a:r>
-            <a:endParaRPr lang="en-US" sz="2800" dirty="0" smtClean="0">
-              <a:latin typeface="Georgia"/>
-              <a:cs typeface="Georgia"/>
-            </a:endParaRPr>
+              <a:t>The Simple API for Grid Applications (SAGA), a proposed recommendation of the Open Grid Forum (OGF), defines a high-level programmatic interface for developers of Distributed Applications [1]. The fundamental idea of SAGA is to lower the barrier for applications and application scientists to utilize distributed infrastructure. SAGA provides a simple, uniform, stable interface to the most often required functionality in order to construct general purpose, extensible and scalable applications.</a:t>
+            </a:r>
           </a:p>
           <a:p>
             <a:pPr algn="just">
@@ -4463,14 +4421,7 @@
                 <a:latin typeface="Georgia"/>
                 <a:cs typeface="Georgia"/>
               </a:rPr>
-              <a:t>Our </a:t>
-            </a:r>
-            <a:r>
-              <a:rPr lang="en-US" sz="2800" dirty="0" smtClean="0">
-                <a:latin typeface="Georgia"/>
-                <a:cs typeface="Georgia"/>
-              </a:rPr>
-              <a:t>group has lead the SAGA effort, starting from the specification effort at the OGF to providing the first C++ implementation [2]. We are also developing several different novel applications, using SAGA to harness the power of distributed infrastructure.</a:t>
+              <a:t>Our group has lead the SAGA effort, starting from the specification effort at the OGF to providing the first C++ implementation [2]. We are also developing several different novel applications, using SAGA to harness the power of distributed infrastructure.</a:t>
             </a:r>
             <a:endParaRPr lang="en-US" sz="2800" dirty="0" smtClean="0">
               <a:latin typeface="Georgia"/>
@@ -4484,18 +4435,32 @@
               </a:spcAft>
             </a:pPr>
             <a:r>
+              <a:rPr lang="en-US" sz="2800" smtClean="0">
+                <a:latin typeface="Georgia"/>
+                <a:cs typeface="Georgia"/>
+              </a:rPr>
+              <a:t>We </a:t>
+            </a:r>
+            <a:r>
               <a:rPr lang="en-US" sz="2800" dirty="0" smtClean="0">
                 <a:latin typeface="Georgia"/>
                 <a:cs typeface="Georgia"/>
               </a:rPr>
-              <a:t>From </a:t>
+              <a:t>present different types of distributed applications being </a:t>
             </a:r>
             <a:r>
               <a:rPr lang="en-US" sz="2800" dirty="0" smtClean="0">
                 <a:latin typeface="Georgia"/>
                 <a:cs typeface="Georgia"/>
               </a:rPr>
-              <a:t>the vision we have for the project and also from our experience developing on top of it, we believe SAGA is truly an enabler in the development of Distributed Applications. Here we present different types of distributed applications being developed on top of SAGA. Namely, (</a:t>
+              <a:t>developed using  </a:t>
+            </a:r>
+            <a:r>
+              <a:rPr lang="en-US" sz="2800" dirty="0" smtClean="0">
+                <a:latin typeface="Georgia"/>
+                <a:cs typeface="Georgia"/>
+              </a:rPr>
+              <a:t>SAGA. Namely, (</a:t>
             </a:r>
             <a:r>
               <a:rPr lang="en-US" sz="2800" dirty="0" err="1" smtClean="0">
@@ -4509,15 +4474,33 @@
                 <a:latin typeface="Georgia"/>
                 <a:cs typeface="Georgia"/>
               </a:rPr>
-              <a:t>) porting legacy applications to utilize distributed resources; (ii) development of applications based upon abstractions and frameworks that are themselves developed using SAGA; (iii) first principles applications, explicitly cognizant of the fact that they will operate in a distributed environment, where the application logic is coupled with the distributed logic. SAGA Supports all such development</a:t>
+              <a:t>) porting legacy applications to utilize distributed resources; (ii) development of applications based upon abstractions and frameworks that are themselves developed using SAGA; (iii) first principles applications, explicitly cognizant of the fact that they will operate in a distributed environment, where the application logic is coupled with the distributed logic. SAGA</a:t>
             </a:r>
             <a:r>
               <a:rPr lang="en-US" sz="2800" dirty="0" smtClean="0">
                 <a:latin typeface="Georgia"/>
                 <a:cs typeface="Georgia"/>
               </a:rPr>
-              <a:t>.</a:t>
-            </a:r>
+              <a:t> supports the development of these applications and many others, thus providing a tool to develop a broad </a:t>
+            </a:r>
+            <a:r>
+              <a:rPr lang="en-US" sz="2800" dirty="0" smtClean="0">
+                <a:latin typeface="Georgia"/>
+                <a:cs typeface="Georgia"/>
+              </a:rPr>
+              <a:t>and </a:t>
+            </a:r>
+            <a:r>
+              <a:rPr lang="en-US" sz="2800" dirty="0" smtClean="0">
+                <a:latin typeface="Georgia"/>
+                <a:cs typeface="Georgia"/>
+              </a:rPr>
+              <a:t>general class of applications. </a:t>
+            </a:r>
+            <a:endParaRPr lang="en-US" sz="2800" dirty="0" smtClean="0">
+              <a:latin typeface="Georgia"/>
+              <a:cs typeface="Georgia"/>
+            </a:endParaRPr>
           </a:p>
         </p:txBody>
       </p:sp>
@@ -4769,11 +4752,6 @@
               </a:rPr>
               <a:t>Acknowledgements</a:t>
             </a:r>
-            <a:endParaRPr lang="en-US" sz="5400" b="1" dirty="0" smtClean="0">
-              <a:solidFill>
-                <a:srgbClr val="000099"/>
-              </a:solidFill>
-            </a:endParaRPr>
           </a:p>
           <a:p>
             <a:pPr algn="ctr"/>
@@ -4791,23 +4769,7 @@
                   <a:srgbClr val="000099"/>
                 </a:solidFill>
               </a:rPr>
-              <a:t>This work was supported by NSF and the Louisiana </a:t>
-            </a:r>
-            <a:r>
-              <a:rPr lang="en-US" sz="2800" b="1" dirty="0" smtClean="0">
-                <a:solidFill>
-                  <a:srgbClr val="000099"/>
-                </a:solidFill>
-              </a:rPr>
-              <a:t>Board-of-Regents</a:t>
-            </a:r>
-            <a:r>
-              <a:rPr lang="en-US" sz="2800" b="1" dirty="0" smtClean="0">
-                <a:solidFill>
-                  <a:srgbClr val="000099"/>
-                </a:solidFill>
-              </a:rPr>
-              <a:t>.</a:t>
+              <a:t>This work was supported by NSF and the Louisiana Board-of-Regents.</a:t>
             </a:r>
             <a:endParaRPr lang="en-US" sz="2800" b="1" dirty="0">
               <a:solidFill>
@@ -4886,15 +4848,7 @@
                   <a:srgbClr val="000099"/>
                 </a:solidFill>
               </a:rPr>
-              <a:t>SAGA </a:t>
-            </a:r>
-            <a:r>
-              <a:rPr lang="en-US" sz="2800" b="1" dirty="0" smtClean="0">
-                <a:solidFill>
-                  <a:srgbClr val="000099"/>
-                </a:solidFill>
-              </a:rPr>
-              <a:t>is being used within the </a:t>
+              <a:t>SAGA is being used within the </a:t>
             </a:r>
             <a:r>
               <a:rPr lang="en-US" sz="2800" b="1" dirty="0" err="1" smtClean="0">
@@ -5274,31 +5228,7 @@
                   <a:srgbClr val="000099"/>
                 </a:solidFill>
               </a:rPr>
-              <a:t>SAGA </a:t>
-            </a:r>
-            <a:r>
-              <a:rPr lang="en-US" sz="2800" b="1" dirty="0" smtClean="0">
-                <a:solidFill>
-                  <a:srgbClr val="000099"/>
-                </a:solidFill>
-              </a:rPr>
-              <a:t>- A Simple API for Grid Applications, [Online]</a:t>
-            </a:r>
-            <a:r>
-              <a:rPr lang="en-US" sz="2800" b="1" dirty="0" smtClean="0">
-                <a:solidFill>
-                  <a:srgbClr val="000099"/>
-                </a:solidFill>
-              </a:rPr>
-              <a:t>.</a:t>
-            </a:r>
-            <a:r>
-              <a:rPr lang="en-US" sz="2800" b="1" dirty="0" smtClean="0">
-                <a:solidFill>
-                  <a:srgbClr val="000099"/>
-                </a:solidFill>
-              </a:rPr>
-              <a:t/>
+              <a:t>SAGA - A Simple API for Grid Applications, [Online].</a:t>
             </a:r>
             <a:br>
               <a:rPr lang="en-US" sz="2800" b="1" dirty="0" smtClean="0">
@@ -5313,15 +5243,7 @@
                   <a:srgbClr val="000099"/>
                 </a:solidFill>
               </a:rPr>
-              <a:t>http</a:t>
-            </a:r>
-            <a:r>
-              <a:rPr lang="en-US" sz="2800" b="1" dirty="0" smtClean="0">
-                <a:solidFill>
-                  <a:srgbClr val="000099"/>
-                </a:solidFill>
-              </a:rPr>
-              <a:t>://</a:t>
+              <a:t>http://</a:t>
             </a:r>
             <a:r>
               <a:rPr lang="en-US" sz="2800" b="1" dirty="0" err="1" smtClean="0">

</xml_diff>

<commit_message>
Formatting. Added Ole's diagrams.
git-svn-id: file://localhost/tmp/svn2git/svn@241 defb5e50-622e-49ec-a68e-d72c7db87b45
</commit_message>
<xml_diff>
--- a/papers/cybertools08_poster/poster.pptx
+++ b/papers/cybertools08_poster/poster.pptx
@@ -4324,9 +4324,9 @@
                   </a:outerShdw>
                 </a:effectLst>
               </a:rPr>
-              <a:t>Center for Computation &amp; Technology, Louisiana State University, Baton Rouge, U.S.A.</a:t>
-            </a:r>
-            <a:br>
+              <a:t>Center for Computation &amp; Technology, Louisiana State University, Baton Rouge, U.S.A</a:t>
+            </a:r>
+            <a:r>
               <a:rPr lang="en-US" altLang="zh-TW" sz="3600" b="1" dirty="0" smtClean="0">
                 <a:solidFill>
                   <a:schemeClr val="bg1"/>
@@ -4337,7 +4337,8 @@
                   </a:outerShdw>
                 </a:effectLst>
               </a:rPr>
-            </a:br>
+              <a:t>.</a:t>
+            </a:r>
             <a:endParaRPr lang="en-US" altLang="zh-TW" sz="5500" dirty="0" smtClean="0"/>
           </a:p>
         </p:txBody>
@@ -4353,7 +4354,7 @@
         <p:spPr bwMode="auto">
           <a:xfrm>
             <a:off x="897388" y="4968870"/>
-            <a:ext cx="13716000" cy="11271168"/>
+            <a:ext cx="13716000" cy="15343177"/>
           </a:xfrm>
           <a:prstGeom prst="roundRect">
             <a:avLst>
@@ -4373,12 +4374,19 @@
           </a:ln>
         </p:spPr>
         <p:txBody>
-          <a:bodyPr wrap="square" anchor="t">
+          <a:bodyPr wrap="square" lIns="274320" rIns="274320" bIns="548640" anchor="t">
             <a:spAutoFit/>
           </a:bodyPr>
           <a:lstStyle/>
           <a:p>
-            <a:pPr algn="ctr"/>
+            <a:pPr algn="ctr">
+              <a:lnSpc>
+                <a:spcPct val="130000"/>
+              </a:lnSpc>
+              <a:spcAft>
+                <a:spcPts val="1800"/>
+              </a:spcAft>
+            </a:pPr>
             <a:r>
               <a:rPr lang="en-US" sz="5400" b="1" dirty="0" smtClean="0">
                 <a:solidFill>
@@ -4387,9 +4395,6 @@
               </a:rPr>
               <a:t>Abstract</a:t>
             </a:r>
-          </a:p>
-          <a:p>
-            <a:pPr algn="ctr"/>
             <a:endParaRPr lang="en-US" sz="4000" b="1" dirty="0" smtClean="0">
               <a:solidFill>
                 <a:srgbClr val="000099"/>
@@ -4398,6 +4403,9 @@
           </a:p>
           <a:p>
             <a:pPr algn="just">
+              <a:lnSpc>
+                <a:spcPct val="130000"/>
+              </a:lnSpc>
               <a:spcAft>
                 <a:spcPts val="1800"/>
               </a:spcAft>
@@ -4412,6 +4420,9 @@
           </a:p>
           <a:p>
             <a:pPr algn="just">
+              <a:lnSpc>
+                <a:spcPct val="130000"/>
+              </a:lnSpc>
               <a:spcAft>
                 <a:spcPts val="1800"/>
               </a:spcAft>
@@ -4423,84 +4434,37 @@
               </a:rPr>
               <a:t>Our group has lead the SAGA effort, starting from the specification effort at the OGF to providing the first C++ implementation [2]. We are also developing several different novel applications, using SAGA to harness the power of distributed infrastructure.</a:t>
             </a:r>
-            <a:endParaRPr lang="en-US" sz="2800" dirty="0" smtClean="0">
-              <a:latin typeface="Georgia"/>
-              <a:cs typeface="Georgia"/>
-            </a:endParaRPr>
           </a:p>
           <a:p>
             <a:pPr algn="just">
+              <a:lnSpc>
+                <a:spcPct val="130000"/>
+              </a:lnSpc>
               <a:spcAft>
                 <a:spcPts val="1800"/>
               </a:spcAft>
             </a:pPr>
             <a:r>
-              <a:rPr lang="en-US" sz="2800" smtClean="0">
-                <a:latin typeface="Georgia"/>
-                <a:cs typeface="Georgia"/>
-              </a:rPr>
-              <a:t>We </a:t>
-            </a:r>
-            <a:r>
               <a:rPr lang="en-US" sz="2800" dirty="0" smtClean="0">
                 <a:latin typeface="Georgia"/>
                 <a:cs typeface="Georgia"/>
               </a:rPr>
-              <a:t>present different types of distributed applications being </a:t>
+              <a:t>From the vision we have for the project and also from our experience developing on top of it, we believe SAGA is truly an enabler in the development of Distributed Applications. Here we present different types of distributed applications being developed on top of SAGA. Namely, (</a:t>
+            </a:r>
+            <a:r>
+              <a:rPr lang="en-US" sz="2800" dirty="0" err="1" smtClean="0">
+                <a:latin typeface="Georgia"/>
+                <a:cs typeface="Georgia"/>
+              </a:rPr>
+              <a:t>i</a:t>
             </a:r>
             <a:r>
               <a:rPr lang="en-US" sz="2800" dirty="0" smtClean="0">
                 <a:latin typeface="Georgia"/>
                 <a:cs typeface="Georgia"/>
               </a:rPr>
-              <a:t>developed using  </a:t>
-            </a:r>
-            <a:r>
-              <a:rPr lang="en-US" sz="2800" dirty="0" smtClean="0">
-                <a:latin typeface="Georgia"/>
-                <a:cs typeface="Georgia"/>
-              </a:rPr>
-              <a:t>SAGA. Namely, (</a:t>
-            </a:r>
-            <a:r>
-              <a:rPr lang="en-US" sz="2800" dirty="0" err="1" smtClean="0">
-                <a:latin typeface="Georgia"/>
-                <a:cs typeface="Georgia"/>
-              </a:rPr>
-              <a:t>i</a:t>
-            </a:r>
-            <a:r>
-              <a:rPr lang="en-US" sz="2800" dirty="0" smtClean="0">
-                <a:latin typeface="Georgia"/>
-                <a:cs typeface="Georgia"/>
-              </a:rPr>
-              <a:t>) porting legacy applications to utilize distributed resources; (ii) development of applications based upon abstractions and frameworks that are themselves developed using SAGA; (iii) first principles applications, explicitly cognizant of the fact that they will operate in a distributed environment, where the application logic is coupled with the distributed logic. SAGA</a:t>
-            </a:r>
-            <a:r>
-              <a:rPr lang="en-US" sz="2800" dirty="0" smtClean="0">
-                <a:latin typeface="Georgia"/>
-                <a:cs typeface="Georgia"/>
-              </a:rPr>
-              <a:t> supports the development of these applications and many others, thus providing a tool to develop a broad </a:t>
-            </a:r>
-            <a:r>
-              <a:rPr lang="en-US" sz="2800" dirty="0" smtClean="0">
-                <a:latin typeface="Georgia"/>
-                <a:cs typeface="Georgia"/>
-              </a:rPr>
-              <a:t>and </a:t>
-            </a:r>
-            <a:r>
-              <a:rPr lang="en-US" sz="2800" dirty="0" smtClean="0">
-                <a:latin typeface="Georgia"/>
-                <a:cs typeface="Georgia"/>
-              </a:rPr>
-              <a:t>general class of applications. </a:t>
-            </a:r>
-            <a:endParaRPr lang="en-US" sz="2800" dirty="0" smtClean="0">
-              <a:latin typeface="Georgia"/>
-              <a:cs typeface="Georgia"/>
-            </a:endParaRPr>
+              <a:t>) porting legacy applications to utilize distributed resources; (ii) development of applications based upon abstractions and frameworks that are themselves developed using SAGA; (iii) first principles applications, explicitly cognizant of the fact that they will operate in a distributed environment, where the application logic is coupled with the distributed logic. SAGA Supports all such development.</a:t>
+            </a:r>
           </a:p>
         </p:txBody>
       </p:sp>
@@ -4711,276 +4675,6 @@
           </a:prstGeom>
         </p:spPr>
       </p:pic>
-      <p:sp>
-        <p:nvSpPr>
-          <p:cNvPr id="147" name="AutoShape 1627"/>
-          <p:cNvSpPr>
-            <a:spLocks noChangeArrowheads="1"/>
-          </p:cNvSpPr>
-          <p:nvPr/>
-        </p:nvSpPr>
-        <p:spPr bwMode="auto">
-          <a:xfrm>
-            <a:off x="29265568" y="22442394"/>
-            <a:ext cx="13716000" cy="2738215"/>
-          </a:xfrm>
-          <a:prstGeom prst="roundRect">
-            <a:avLst>
-              <a:gd name="adj" fmla="val 27737"/>
-            </a:avLst>
-          </a:prstGeom>
-          <a:noFill/>
-          <a:ln w="76200">
-            <a:solidFill>
-              <a:srgbClr val="000099"/>
-            </a:solidFill>
-            <a:round/>
-            <a:headEnd/>
-            <a:tailEnd/>
-          </a:ln>
-        </p:spPr>
-        <p:txBody>
-          <a:bodyPr wrap="none" anchor="t"/>
-          <a:lstStyle/>
-          <a:p>
-            <a:pPr algn="ctr"/>
-            <a:r>
-              <a:rPr lang="en-US" sz="5400" b="1" dirty="0" smtClean="0">
-                <a:solidFill>
-                  <a:srgbClr val="000099"/>
-                </a:solidFill>
-              </a:rPr>
-              <a:t>Acknowledgements</a:t>
-            </a:r>
-          </a:p>
-          <a:p>
-            <a:pPr algn="ctr"/>
-            <a:endParaRPr lang="en-US" sz="4000" b="1" dirty="0" smtClean="0">
-              <a:solidFill>
-                <a:srgbClr val="000099"/>
-              </a:solidFill>
-            </a:endParaRPr>
-          </a:p>
-          <a:p>
-            <a:pPr algn="ctr"/>
-            <a:r>
-              <a:rPr lang="en-US" sz="2800" b="1" dirty="0" smtClean="0">
-                <a:solidFill>
-                  <a:srgbClr val="000099"/>
-                </a:solidFill>
-              </a:rPr>
-              <a:t>This work was supported by NSF and the Louisiana Board-of-Regents.</a:t>
-            </a:r>
-            <a:endParaRPr lang="en-US" sz="2800" b="1" dirty="0">
-              <a:solidFill>
-                <a:srgbClr val="000099"/>
-              </a:solidFill>
-            </a:endParaRPr>
-          </a:p>
-        </p:txBody>
-      </p:sp>
-      <p:sp>
-        <p:nvSpPr>
-          <p:cNvPr id="150" name="AutoShape 1627"/>
-          <p:cNvSpPr>
-            <a:spLocks noChangeArrowheads="1"/>
-          </p:cNvSpPr>
-          <p:nvPr/>
-        </p:nvSpPr>
-        <p:spPr bwMode="auto">
-          <a:xfrm>
-            <a:off x="29265568" y="8283095"/>
-            <a:ext cx="13716000" cy="10885712"/>
-          </a:xfrm>
-          <a:prstGeom prst="roundRect">
-            <a:avLst>
-              <a:gd name="adj" fmla="val 9477"/>
-            </a:avLst>
-          </a:prstGeom>
-          <a:noFill/>
-          <a:ln w="76200">
-            <a:solidFill>
-              <a:srgbClr val="000099"/>
-            </a:solidFill>
-            <a:round/>
-            <a:headEnd/>
-            <a:tailEnd/>
-          </a:ln>
-        </p:spPr>
-        <p:txBody>
-          <a:bodyPr wrap="square" anchor="t"/>
-          <a:lstStyle/>
-          <a:p>
-            <a:pPr algn="ctr"/>
-            <a:r>
-              <a:rPr lang="en-US" sz="5400" b="1" dirty="0" smtClean="0">
-                <a:solidFill>
-                  <a:srgbClr val="000099"/>
-                </a:solidFill>
-              </a:rPr>
-              <a:t>Connections with </a:t>
-            </a:r>
-            <a:r>
-              <a:rPr lang="en-US" sz="5400" b="1" dirty="0" err="1" smtClean="0">
-                <a:solidFill>
-                  <a:srgbClr val="000099"/>
-                </a:solidFill>
-              </a:rPr>
-              <a:t>CyberTools</a:t>
-            </a:r>
-            <a:endParaRPr lang="en-US" sz="5400" b="1" dirty="0" smtClean="0">
-              <a:solidFill>
-                <a:srgbClr val="000099"/>
-              </a:solidFill>
-            </a:endParaRPr>
-          </a:p>
-          <a:p>
-            <a:endParaRPr lang="en-US" sz="4000" b="1" dirty="0" smtClean="0">
-              <a:solidFill>
-                <a:srgbClr val="000099"/>
-              </a:solidFill>
-            </a:endParaRPr>
-          </a:p>
-          <a:p>
-            <a:r>
-              <a:rPr lang="en-US" sz="2800" b="1" dirty="0" smtClean="0">
-                <a:solidFill>
-                  <a:srgbClr val="000099"/>
-                </a:solidFill>
-              </a:rPr>
-              <a:t>SAGA is being used within the </a:t>
-            </a:r>
-            <a:r>
-              <a:rPr lang="en-US" sz="2800" b="1" dirty="0" err="1" smtClean="0">
-                <a:solidFill>
-                  <a:srgbClr val="000099"/>
-                </a:solidFill>
-              </a:rPr>
-              <a:t>Cybertools</a:t>
-            </a:r>
-            <a:r>
-              <a:rPr lang="en-US" sz="2800" b="1" dirty="0" smtClean="0">
-                <a:solidFill>
-                  <a:srgbClr val="000099"/>
-                </a:solidFill>
-              </a:rPr>
-              <a:t> project in several critical ways:</a:t>
-            </a:r>
-          </a:p>
-          <a:p>
-            <a:endParaRPr lang="en-US" sz="2800" b="1" dirty="0" smtClean="0">
-              <a:solidFill>
-                <a:srgbClr val="000099"/>
-              </a:solidFill>
-            </a:endParaRPr>
-          </a:p>
-          <a:p>
-            <a:r>
-              <a:rPr lang="en-US" sz="2800" b="1" dirty="0" smtClean="0">
-                <a:solidFill>
-                  <a:srgbClr val="000099"/>
-                </a:solidFill>
-              </a:rPr>
-              <a:t> - It is being used to create a general purpose "Application Manager", that will enable many science drivers to utilize remote LONI machines without any changes to the execution environment. In particular it</a:t>
-            </a:r>
-          </a:p>
-          <a:p>
-            <a:r>
-              <a:rPr lang="en-US" sz="2800" b="1" dirty="0" smtClean="0">
-                <a:solidFill>
-                  <a:srgbClr val="000099"/>
-                </a:solidFill>
-              </a:rPr>
-              <a:t>can be used to support specific application usage patterns, for example,</a:t>
-            </a:r>
-          </a:p>
-          <a:p>
-            <a:r>
-              <a:rPr lang="en-US" sz="2800" b="1" dirty="0" smtClean="0">
-                <a:solidFill>
-                  <a:srgbClr val="000099"/>
-                </a:solidFill>
-              </a:rPr>
-              <a:t>it has been used for distributed replica-exchange simulations using NAMD.</a:t>
-            </a:r>
-          </a:p>
-          <a:p>
-            <a:endParaRPr lang="en-US" sz="2800" b="1" dirty="0" smtClean="0">
-              <a:solidFill>
-                <a:srgbClr val="000099"/>
-              </a:solidFill>
-            </a:endParaRPr>
-          </a:p>
-          <a:p>
-            <a:r>
-              <a:rPr lang="en-US" sz="2800" b="1" dirty="0" smtClean="0">
-                <a:solidFill>
-                  <a:srgbClr val="000099"/>
-                </a:solidFill>
-              </a:rPr>
-              <a:t> - SAGA will be the interfaced with Cactus applications to use</a:t>
-            </a:r>
-          </a:p>
-          <a:p>
-            <a:r>
-              <a:rPr lang="en-US" sz="2800" b="1" dirty="0" smtClean="0">
-                <a:solidFill>
-                  <a:srgbClr val="000099"/>
-                </a:solidFill>
-              </a:rPr>
-              <a:t>Information Services and other advanced </a:t>
-            </a:r>
-            <a:r>
-              <a:rPr lang="en-US" sz="2800" b="1" dirty="0" err="1" smtClean="0">
-                <a:solidFill>
-                  <a:srgbClr val="000099"/>
-                </a:solidFill>
-              </a:rPr>
-              <a:t>CyberInfrastructure</a:t>
-            </a:r>
-            <a:r>
-              <a:rPr lang="en-US" sz="2800" b="1" dirty="0" smtClean="0">
-                <a:solidFill>
-                  <a:srgbClr val="000099"/>
-                </a:solidFill>
-              </a:rPr>
-              <a:t> features.</a:t>
-            </a:r>
-          </a:p>
-          <a:p>
-            <a:endParaRPr lang="en-US" sz="2800" b="1" dirty="0" smtClean="0">
-              <a:solidFill>
-                <a:srgbClr val="000099"/>
-              </a:solidFill>
-            </a:endParaRPr>
-          </a:p>
-          <a:p>
-            <a:r>
-              <a:rPr lang="en-US" sz="2800" b="1" dirty="0" smtClean="0">
-                <a:solidFill>
-                  <a:srgbClr val="000099"/>
-                </a:solidFill>
-              </a:rPr>
-              <a:t> - SAGA will also provide the basic capability for interfacing multi-physics applications (via extension to the API to support</a:t>
-            </a:r>
-          </a:p>
-          <a:p>
-            <a:r>
-              <a:rPr lang="en-US" sz="2800" b="1" dirty="0" smtClean="0">
-                <a:solidFill>
-                  <a:srgbClr val="000099"/>
-                </a:solidFill>
-              </a:rPr>
-              <a:t>messaging)</a:t>
-            </a:r>
-            <a:endParaRPr lang="en-US" sz="2800" b="1" dirty="0">
-              <a:solidFill>
-                <a:srgbClr val="000099"/>
-              </a:solidFill>
-            </a:endParaRPr>
-          </a:p>
-        </p:txBody>
-      </p:sp>
       <p:grpSp>
         <p:nvGrpSpPr>
           <p:cNvPr id="13" name="Group 12"/>
@@ -5067,7 +4761,7 @@
       </p:grpSp>
       <p:sp>
         <p:nvSpPr>
-          <p:cNvPr id="15" name="AutoShape 1627"/>
+          <p:cNvPr id="17" name="AutoShape 1627"/>
           <p:cNvSpPr>
             <a:spLocks noChangeArrowheads="1"/>
           </p:cNvSpPr>
@@ -5075,15 +4769,17 @@
         </p:nvSpPr>
         <p:spPr bwMode="auto">
           <a:xfrm>
-            <a:off x="29265568" y="25852215"/>
-            <a:ext cx="13716000" cy="6190342"/>
+            <a:off x="897388" y="20726400"/>
+            <a:ext cx="27900090" cy="8839200"/>
           </a:xfrm>
           <a:prstGeom prst="roundRect">
             <a:avLst>
-              <a:gd name="adj" fmla="val 27737"/>
+              <a:gd name="adj" fmla="val 16667"/>
             </a:avLst>
           </a:prstGeom>
-          <a:noFill/>
+          <a:solidFill>
+            <a:srgbClr val="FFFFFF"/>
+          </a:solidFill>
           <a:ln w="76200">
             <a:solidFill>
               <a:srgbClr val="000099"/>
@@ -5094,170 +4790,842 @@
           </a:ln>
         </p:spPr>
         <p:txBody>
-          <a:bodyPr wrap="square" anchor="t"/>
-          <a:lstStyle/>
-          <a:p>
-            <a:pPr algn="ctr"/>
+          <a:bodyPr wrap="square" lIns="274320" rIns="274320" bIns="548640" anchor="t">
+            <a:noAutofit/>
+          </a:bodyPr>
+          <a:lstStyle/>
+          <a:p>
+            <a:pPr algn="ctr">
+              <a:lnSpc>
+                <a:spcPct val="130000"/>
+              </a:lnSpc>
+              <a:spcAft>
+                <a:spcPts val="1800"/>
+              </a:spcAft>
+            </a:pPr>
+            <a:endParaRPr lang="en-US" sz="2800" dirty="0" smtClean="0">
+              <a:latin typeface="Georgia"/>
+              <a:cs typeface="Georgia"/>
+            </a:endParaRPr>
+          </a:p>
+        </p:txBody>
+      </p:sp>
+      <p:sp>
+        <p:nvSpPr>
+          <p:cNvPr id="19" name="AutoShape 1627"/>
+          <p:cNvSpPr>
+            <a:spLocks noChangeArrowheads="1"/>
+          </p:cNvSpPr>
+          <p:nvPr/>
+        </p:nvSpPr>
+        <p:spPr bwMode="auto">
+          <a:xfrm>
+            <a:off x="15081478" y="4968870"/>
+            <a:ext cx="13716000" cy="4205406"/>
+          </a:xfrm>
+          <a:prstGeom prst="roundRect">
+            <a:avLst>
+              <a:gd name="adj" fmla="val 16667"/>
+            </a:avLst>
+          </a:prstGeom>
+          <a:solidFill>
+            <a:srgbClr val="FFFFFF"/>
+          </a:solidFill>
+          <a:ln w="76200">
+            <a:solidFill>
+              <a:srgbClr val="000099"/>
+            </a:solidFill>
+            <a:round/>
+            <a:headEnd/>
+            <a:tailEnd/>
+          </a:ln>
+        </p:spPr>
+        <p:txBody>
+          <a:bodyPr wrap="square" lIns="274320" rIns="274320" bIns="548640" anchor="t">
+            <a:spAutoFit/>
+          </a:bodyPr>
+          <a:lstStyle/>
+          <a:p>
+            <a:pPr algn="ctr">
+              <a:lnSpc>
+                <a:spcPct val="130000"/>
+              </a:lnSpc>
+              <a:spcAft>
+                <a:spcPts val="1800"/>
+              </a:spcAft>
+            </a:pPr>
             <a:r>
               <a:rPr lang="en-US" sz="5400" b="1" dirty="0" smtClean="0">
                 <a:solidFill>
                   <a:srgbClr val="000099"/>
                 </a:solidFill>
               </a:rPr>
-              <a:t>References</a:t>
-            </a:r>
-          </a:p>
-          <a:p>
-            <a:pPr marL="571500" indent="-571500" algn="ctr"/>
-            <a:endParaRPr lang="en-US" sz="2800" b="1" dirty="0" smtClean="0">
+              <a:t>Exa</a:t>
+            </a:r>
+            <a:r>
+              <a:rPr lang="en-US" sz="5400" b="1" dirty="0" smtClean="0">
+                <a:solidFill>
+                  <a:srgbClr val="000099"/>
+                </a:solidFill>
+              </a:rPr>
+              <a:t>mples</a:t>
+            </a:r>
+            <a:endParaRPr lang="en-US" sz="4000" b="1" dirty="0" smtClean="0">
               <a:solidFill>
                 <a:srgbClr val="000099"/>
               </a:solidFill>
             </a:endParaRPr>
           </a:p>
           <a:p>
-            <a:pPr marL="571500" indent="-571500">
-              <a:buFont typeface="+mj-lt"/>
-              <a:buAutoNum type="arabicPeriod"/>
+            <a:pPr algn="just">
+              <a:lnSpc>
+                <a:spcPct val="130000"/>
+              </a:lnSpc>
+              <a:spcAft>
+                <a:spcPts val="1800"/>
+              </a:spcAft>
             </a:pPr>
             <a:r>
-              <a:rPr lang="en-US" sz="2800" b="1" dirty="0" err="1" smtClean="0">
+              <a:rPr lang="en-US" sz="2800" dirty="0" smtClean="0">
+                <a:latin typeface="Georgia"/>
+                <a:cs typeface="Georgia"/>
+              </a:rPr>
+              <a:t>Blah, blah, blah</a:t>
+            </a:r>
+          </a:p>
+          <a:p>
+            <a:pPr algn="just">
+              <a:lnSpc>
+                <a:spcPct val="130000"/>
+              </a:lnSpc>
+              <a:spcAft>
+                <a:spcPts val="1800"/>
+              </a:spcAft>
+            </a:pPr>
+            <a:r>
+              <a:rPr lang="en-US" sz="2800" dirty="0" smtClean="0">
+                <a:latin typeface="Georgia"/>
+                <a:cs typeface="Georgia"/>
+              </a:rPr>
+              <a:t>Blah, blah, blah</a:t>
+            </a:r>
+            <a:br>
+              <a:rPr lang="en-US" sz="2800" dirty="0" smtClean="0">
+                <a:latin typeface="Georgia"/>
+                <a:cs typeface="Georgia"/>
+              </a:rPr>
+            </a:br>
+            <a:r>
+              <a:rPr lang="en-US" sz="2800" dirty="0" smtClean="0">
+                <a:latin typeface="Georgia"/>
+                <a:cs typeface="Georgia"/>
+              </a:rPr>
+              <a:t>blah blah blah</a:t>
+            </a:r>
+          </a:p>
+        </p:txBody>
+      </p:sp>
+      <p:sp>
+        <p:nvSpPr>
+          <p:cNvPr id="20" name="AutoShape 1627"/>
+          <p:cNvSpPr>
+            <a:spLocks noChangeArrowheads="1"/>
+          </p:cNvSpPr>
+          <p:nvPr/>
+        </p:nvSpPr>
+        <p:spPr bwMode="auto">
+          <a:xfrm>
+            <a:off x="29265568" y="24740449"/>
+            <a:ext cx="13716000" cy="4825151"/>
+          </a:xfrm>
+          <a:prstGeom prst="roundRect">
+            <a:avLst>
+              <a:gd name="adj" fmla="val 16667"/>
+            </a:avLst>
+          </a:prstGeom>
+          <a:solidFill>
+            <a:srgbClr val="FFFFFF"/>
+          </a:solidFill>
+          <a:ln w="76200">
+            <a:solidFill>
+              <a:srgbClr val="000099"/>
+            </a:solidFill>
+            <a:round/>
+            <a:headEnd/>
+            <a:tailEnd/>
+          </a:ln>
+        </p:spPr>
+        <p:txBody>
+          <a:bodyPr wrap="square" lIns="274320" rIns="274320" bIns="548640" anchor="t">
+            <a:spAutoFit/>
+          </a:bodyPr>
+          <a:lstStyle/>
+          <a:p>
+            <a:pPr algn="ctr">
+              <a:lnSpc>
+                <a:spcPct val="130000"/>
+              </a:lnSpc>
+              <a:spcAft>
+                <a:spcPts val="1800"/>
+              </a:spcAft>
+            </a:pPr>
+            <a:r>
+              <a:rPr lang="en-US" sz="5400" b="1" dirty="0" smtClean="0">
                 <a:solidFill>
                   <a:srgbClr val="000099"/>
                 </a:solidFill>
               </a:rPr>
-              <a:t>Goodale</a:t>
-            </a:r>
-            <a:r>
-              <a:rPr lang="en-US" sz="2800" b="1" dirty="0" smtClean="0">
-                <a:solidFill>
-                  <a:srgbClr val="000099"/>
-                </a:solidFill>
-              </a:rPr>
-              <a:t>, T, </a:t>
-            </a:r>
-            <a:r>
-              <a:rPr lang="en-US" sz="2800" b="1" dirty="0" err="1" smtClean="0">
-                <a:solidFill>
-                  <a:srgbClr val="000099"/>
-                </a:solidFill>
-              </a:rPr>
-              <a:t>Jha</a:t>
-            </a:r>
-            <a:r>
-              <a:rPr lang="en-US" sz="2800" b="1" dirty="0" smtClean="0">
-                <a:solidFill>
-                  <a:srgbClr val="000099"/>
-                </a:solidFill>
-              </a:rPr>
-              <a:t>, S, Kaiser, H, </a:t>
-            </a:r>
-            <a:r>
-              <a:rPr lang="en-US" sz="2800" b="1" dirty="0" err="1" smtClean="0">
-                <a:solidFill>
-                  <a:srgbClr val="000099"/>
-                </a:solidFill>
-              </a:rPr>
-              <a:t>Kielmann</a:t>
-            </a:r>
-            <a:r>
-              <a:rPr lang="en-US" sz="2800" b="1" dirty="0" smtClean="0">
-                <a:solidFill>
-                  <a:srgbClr val="000099"/>
-                </a:solidFill>
-              </a:rPr>
-              <a:t>, T, </a:t>
-            </a:r>
-            <a:r>
-              <a:rPr lang="en-US" sz="2800" b="1" dirty="0" err="1" smtClean="0">
-                <a:solidFill>
-                  <a:srgbClr val="000099"/>
-                </a:solidFill>
-              </a:rPr>
-              <a:t>Kleijer</a:t>
-            </a:r>
-            <a:r>
-              <a:rPr lang="en-US" sz="2800" b="1" dirty="0" smtClean="0">
-                <a:solidFill>
-                  <a:srgbClr val="000099"/>
-                </a:solidFill>
-              </a:rPr>
-              <a:t>, P, </a:t>
-            </a:r>
-            <a:r>
-              <a:rPr lang="en-US" sz="2800" b="1" dirty="0" err="1" smtClean="0">
-                <a:solidFill>
-                  <a:srgbClr val="000099"/>
-                </a:solidFill>
-              </a:rPr>
-              <a:t>Merzky</a:t>
-            </a:r>
-            <a:r>
-              <a:rPr lang="en-US" sz="2800" b="1" dirty="0" smtClean="0">
-                <a:solidFill>
-                  <a:srgbClr val="000099"/>
-                </a:solidFill>
-              </a:rPr>
-              <a:t>, A, </a:t>
-            </a:r>
-            <a:r>
-              <a:rPr lang="en-US" sz="2800" b="1" dirty="0" err="1" smtClean="0">
-                <a:solidFill>
-                  <a:srgbClr val="000099"/>
-                </a:solidFill>
-              </a:rPr>
-              <a:t>Shalf</a:t>
-            </a:r>
-            <a:r>
-              <a:rPr lang="en-US" sz="2800" b="1" dirty="0" smtClean="0">
-                <a:solidFill>
-                  <a:srgbClr val="000099"/>
-                </a:solidFill>
-              </a:rPr>
-              <a:t>, J, Smith, C, (2007) GFD-R-P.90 A Simple API for Grid Applications (SAGA), Open Grid Forum</a:t>
-            </a:r>
-          </a:p>
-          <a:p>
-            <a:pPr marL="571500" indent="-571500">
-              <a:buFont typeface="+mj-lt"/>
-              <a:buAutoNum type="arabicPeriod"/>
-            </a:pPr>
-            <a:r>
-              <a:rPr lang="en-US" sz="2800" b="1" dirty="0" smtClean="0">
-                <a:solidFill>
-                  <a:srgbClr val="000099"/>
-                </a:solidFill>
-              </a:rPr>
-              <a:t>SAGA - A Simple API for Grid Applications, [Online].</a:t>
-            </a:r>
-            <a:br>
-              <a:rPr lang="en-US" sz="2800" b="1" dirty="0" smtClean="0">
-                <a:solidFill>
-                  <a:srgbClr val="000099"/>
-                </a:solidFill>
-              </a:rPr>
-            </a:br>
-            <a:r>
-              <a:rPr lang="en-US" sz="2800" b="1" dirty="0" smtClean="0">
-                <a:solidFill>
-                  <a:srgbClr val="000099"/>
-                </a:solidFill>
-              </a:rPr>
-              <a:t>http://</a:t>
-            </a:r>
-            <a:r>
-              <a:rPr lang="en-US" sz="2800" b="1" dirty="0" err="1" smtClean="0">
-                <a:solidFill>
-                  <a:srgbClr val="000099"/>
-                </a:solidFill>
-              </a:rPr>
-              <a:t>saga.cct.lsu.edu</a:t>
-            </a:r>
-            <a:endParaRPr lang="en-US" sz="2800" b="1" dirty="0">
+              <a:t>References</a:t>
+            </a:r>
+            <a:endParaRPr lang="en-US" sz="4000" b="1" dirty="0" smtClean="0">
               <a:solidFill>
                 <a:srgbClr val="000099"/>
               </a:solidFill>
             </a:endParaRPr>
+          </a:p>
+          <a:p>
+            <a:pPr marL="514350" indent="-514350" algn="just">
+              <a:lnSpc>
+                <a:spcPct val="130000"/>
+              </a:lnSpc>
+              <a:spcAft>
+                <a:spcPts val="600"/>
+              </a:spcAft>
+              <a:buFont typeface="+mj-lt"/>
+              <a:buAutoNum type="arabicPeriod"/>
+            </a:pPr>
+            <a:r>
+              <a:rPr lang="en-US" sz="2800" dirty="0" err="1" smtClean="0">
+                <a:latin typeface="Georgia"/>
+                <a:cs typeface="Georgia"/>
+              </a:rPr>
+              <a:t>Goodale</a:t>
+            </a:r>
+            <a:r>
+              <a:rPr lang="en-US" sz="2800" dirty="0" smtClean="0">
+                <a:latin typeface="Georgia"/>
+                <a:cs typeface="Georgia"/>
+              </a:rPr>
+              <a:t>, T, </a:t>
+            </a:r>
+            <a:r>
+              <a:rPr lang="en-US" sz="2800" dirty="0" err="1" smtClean="0">
+                <a:latin typeface="Georgia"/>
+                <a:cs typeface="Georgia"/>
+              </a:rPr>
+              <a:t>Jha</a:t>
+            </a:r>
+            <a:r>
+              <a:rPr lang="en-US" sz="2800" dirty="0" smtClean="0">
+                <a:latin typeface="Georgia"/>
+                <a:cs typeface="Georgia"/>
+              </a:rPr>
+              <a:t>, S, Kaiser, H, </a:t>
+            </a:r>
+            <a:r>
+              <a:rPr lang="en-US" sz="2800" dirty="0" err="1" smtClean="0">
+                <a:latin typeface="Georgia"/>
+                <a:cs typeface="Georgia"/>
+              </a:rPr>
+              <a:t>Kielmann</a:t>
+            </a:r>
+            <a:r>
+              <a:rPr lang="en-US" sz="2800" dirty="0" smtClean="0">
+                <a:latin typeface="Georgia"/>
+                <a:cs typeface="Georgia"/>
+              </a:rPr>
+              <a:t>, T, </a:t>
+            </a:r>
+            <a:r>
+              <a:rPr lang="en-US" sz="2800" dirty="0" err="1" smtClean="0">
+                <a:latin typeface="Georgia"/>
+                <a:cs typeface="Georgia"/>
+              </a:rPr>
+              <a:t>Kleijer</a:t>
+            </a:r>
+            <a:r>
+              <a:rPr lang="en-US" sz="2800" dirty="0" smtClean="0">
+                <a:latin typeface="Georgia"/>
+                <a:cs typeface="Georgia"/>
+              </a:rPr>
+              <a:t>, P, </a:t>
+            </a:r>
+            <a:r>
+              <a:rPr lang="en-US" sz="2800" dirty="0" err="1" smtClean="0">
+                <a:latin typeface="Georgia"/>
+                <a:cs typeface="Georgia"/>
+              </a:rPr>
+              <a:t>Merzky</a:t>
+            </a:r>
+            <a:r>
+              <a:rPr lang="en-US" sz="2800" dirty="0" smtClean="0">
+                <a:latin typeface="Georgia"/>
+                <a:cs typeface="Georgia"/>
+              </a:rPr>
+              <a:t>, A, </a:t>
+            </a:r>
+            <a:r>
+              <a:rPr lang="en-US" sz="2800" dirty="0" err="1" smtClean="0">
+                <a:latin typeface="Georgia"/>
+                <a:cs typeface="Georgia"/>
+              </a:rPr>
+              <a:t>Shalf</a:t>
+            </a:r>
+            <a:r>
+              <a:rPr lang="en-US" sz="2800" dirty="0" smtClean="0">
+                <a:latin typeface="Georgia"/>
+                <a:cs typeface="Georgia"/>
+              </a:rPr>
+              <a:t>, J, Smith, C, (2007) GFD-R-P.90 A Simple API for Grid Applications (SAGA), Open Grid Forum</a:t>
+            </a:r>
+          </a:p>
+          <a:p>
+            <a:pPr marL="514350" indent="-514350" algn="just">
+              <a:lnSpc>
+                <a:spcPct val="130000"/>
+              </a:lnSpc>
+              <a:spcAft>
+                <a:spcPts val="600"/>
+              </a:spcAft>
+              <a:buFont typeface="+mj-lt"/>
+              <a:buAutoNum type="arabicPeriod"/>
+            </a:pPr>
+            <a:r>
+              <a:rPr lang="en-US" sz="2800" dirty="0" smtClean="0">
+                <a:latin typeface="Georgia"/>
+                <a:cs typeface="Georgia"/>
+              </a:rPr>
+              <a:t>SAGA C++ Project [Online]. http://</a:t>
+            </a:r>
+            <a:r>
+              <a:rPr lang="en-US" sz="2800" dirty="0" err="1" smtClean="0">
+                <a:latin typeface="Georgia"/>
+                <a:cs typeface="Georgia"/>
+              </a:rPr>
+              <a:t>saga.cct.lsu.edu</a:t>
+            </a:r>
+            <a:endParaRPr lang="en-US" sz="2800" dirty="0" smtClean="0">
+              <a:latin typeface="Georgia"/>
+              <a:cs typeface="Georgia"/>
+            </a:endParaRPr>
+          </a:p>
+        </p:txBody>
+      </p:sp>
+      <p:sp>
+        <p:nvSpPr>
+          <p:cNvPr id="21" name="AutoShape 1627"/>
+          <p:cNvSpPr>
+            <a:spLocks noChangeArrowheads="1"/>
+          </p:cNvSpPr>
+          <p:nvPr/>
+        </p:nvSpPr>
+        <p:spPr bwMode="auto">
+          <a:xfrm>
+            <a:off x="7315200" y="30800338"/>
+            <a:ext cx="35666368" cy="1813262"/>
+          </a:xfrm>
+          <a:prstGeom prst="roundRect">
+            <a:avLst>
+              <a:gd name="adj" fmla="val 16667"/>
+            </a:avLst>
+          </a:prstGeom>
+          <a:noFill/>
+          <a:ln w="76200">
+            <a:noFill/>
+            <a:round/>
+            <a:headEnd/>
+            <a:tailEnd/>
+          </a:ln>
+        </p:spPr>
+        <p:txBody>
+          <a:bodyPr wrap="square" lIns="274320" rIns="274320" bIns="548640" anchor="t">
+            <a:spAutoFit/>
+          </a:bodyPr>
+          <a:lstStyle/>
+          <a:p>
+            <a:pPr>
+              <a:lnSpc>
+                <a:spcPct val="130000"/>
+              </a:lnSpc>
+              <a:spcAft>
+                <a:spcPts val="1800"/>
+              </a:spcAft>
+            </a:pPr>
+            <a:r>
+              <a:rPr lang="en-US" sz="5400" b="1" dirty="0" smtClean="0">
+                <a:solidFill>
+                  <a:srgbClr val="000099"/>
+                </a:solidFill>
+              </a:rPr>
+              <a:t>Acknowledgements: </a:t>
+            </a:r>
+            <a:r>
+              <a:rPr lang="en-US" sz="2800" dirty="0" smtClean="0">
+                <a:latin typeface="Georgia"/>
+                <a:cs typeface="Georgia"/>
+              </a:rPr>
+              <a:t>This work was supported by NSF and the Louisiana Board-of-Regents.</a:t>
+            </a:r>
+            <a:endParaRPr lang="en-US" sz="2800" dirty="0" smtClean="0">
+              <a:latin typeface="Georgia"/>
+              <a:cs typeface="Georgia"/>
+            </a:endParaRPr>
+          </a:p>
+        </p:txBody>
+      </p:sp>
+      <p:sp>
+        <p:nvSpPr>
+          <p:cNvPr id="22" name="AutoShape 1627"/>
+          <p:cNvSpPr>
+            <a:spLocks noChangeArrowheads="1"/>
+          </p:cNvSpPr>
+          <p:nvPr/>
+        </p:nvSpPr>
+        <p:spPr bwMode="auto">
+          <a:xfrm>
+            <a:off x="29265568" y="15240000"/>
+            <a:ext cx="13716000" cy="9054392"/>
+          </a:xfrm>
+          <a:prstGeom prst="roundRect">
+            <a:avLst>
+              <a:gd name="adj" fmla="val 16667"/>
+            </a:avLst>
+          </a:prstGeom>
+          <a:solidFill>
+            <a:srgbClr val="FFFFFF"/>
+          </a:solidFill>
+          <a:ln w="76200">
+            <a:solidFill>
+              <a:srgbClr val="000099"/>
+            </a:solidFill>
+            <a:round/>
+            <a:headEnd/>
+            <a:tailEnd/>
+          </a:ln>
+        </p:spPr>
+        <p:txBody>
+          <a:bodyPr wrap="square" lIns="274320" rIns="274320" bIns="548640" anchor="t">
+            <a:spAutoFit/>
+          </a:bodyPr>
+          <a:lstStyle/>
+          <a:p>
+            <a:pPr algn="ctr">
+              <a:lnSpc>
+                <a:spcPct val="130000"/>
+              </a:lnSpc>
+              <a:spcAft>
+                <a:spcPts val="1800"/>
+              </a:spcAft>
+            </a:pPr>
+            <a:r>
+              <a:rPr lang="en-US" sz="5400" b="1" dirty="0" smtClean="0">
+                <a:solidFill>
+                  <a:srgbClr val="000099"/>
+                </a:solidFill>
+              </a:rPr>
+              <a:t>Connections with </a:t>
+            </a:r>
+            <a:r>
+              <a:rPr lang="en-US" sz="5400" b="1" dirty="0" err="1" smtClean="0">
+                <a:solidFill>
+                  <a:srgbClr val="000099"/>
+                </a:solidFill>
+              </a:rPr>
+              <a:t>CyberTools</a:t>
+            </a:r>
+            <a:endParaRPr lang="en-US" sz="4000" b="1" dirty="0" smtClean="0">
+              <a:solidFill>
+                <a:srgbClr val="000099"/>
+              </a:solidFill>
+            </a:endParaRPr>
+          </a:p>
+          <a:p>
+            <a:pPr algn="just">
+              <a:lnSpc>
+                <a:spcPct val="130000"/>
+              </a:lnSpc>
+              <a:spcAft>
+                <a:spcPts val="1800"/>
+              </a:spcAft>
+            </a:pPr>
+            <a:r>
+              <a:rPr lang="en-US" sz="2800" dirty="0" smtClean="0">
+                <a:latin typeface="Georgia"/>
+                <a:cs typeface="Georgia"/>
+              </a:rPr>
+              <a:t>SAGA is being used within the </a:t>
+            </a:r>
+            <a:r>
+              <a:rPr lang="en-US" sz="2800" dirty="0" err="1" smtClean="0">
+                <a:latin typeface="Georgia"/>
+                <a:cs typeface="Georgia"/>
+              </a:rPr>
+              <a:t>Cybertools</a:t>
+            </a:r>
+            <a:r>
+              <a:rPr lang="en-US" sz="2800" dirty="0" smtClean="0">
+                <a:latin typeface="Georgia"/>
+                <a:cs typeface="Georgia"/>
+              </a:rPr>
+              <a:t> project in several critical ways</a:t>
+            </a:r>
+            <a:r>
+              <a:rPr lang="en-US" sz="2800" dirty="0" smtClean="0">
+                <a:latin typeface="Georgia"/>
+                <a:cs typeface="Georgia"/>
+              </a:rPr>
+              <a:t>:</a:t>
+            </a:r>
+          </a:p>
+          <a:p>
+            <a:pPr marL="457200" indent="-457200" algn="just">
+              <a:lnSpc>
+                <a:spcPct val="130000"/>
+              </a:lnSpc>
+              <a:spcAft>
+                <a:spcPts val="1800"/>
+              </a:spcAft>
+              <a:buFont typeface="Courier New"/>
+              <a:buChar char="o"/>
+            </a:pPr>
+            <a:r>
+              <a:rPr lang="en-US" sz="2800" dirty="0" smtClean="0">
+                <a:latin typeface="Georgia"/>
+                <a:cs typeface="Georgia"/>
+              </a:rPr>
+              <a:t>It </a:t>
+            </a:r>
+            <a:r>
+              <a:rPr lang="en-US" sz="2800" dirty="0" smtClean="0">
+                <a:latin typeface="Georgia"/>
+                <a:cs typeface="Georgia"/>
+              </a:rPr>
+              <a:t>is being used to create a general purpose "Application Manager", </a:t>
+            </a:r>
+            <a:r>
+              <a:rPr lang="en-US" sz="2800" dirty="0" smtClean="0">
+                <a:latin typeface="Georgia"/>
+                <a:cs typeface="Georgia"/>
+              </a:rPr>
+              <a:t>that will </a:t>
+            </a:r>
+            <a:r>
+              <a:rPr lang="en-US" sz="2800" dirty="0" smtClean="0">
+                <a:latin typeface="Georgia"/>
+                <a:cs typeface="Georgia"/>
+              </a:rPr>
+              <a:t>enable many science drivers to utilize remote LONI machines </a:t>
+            </a:r>
+            <a:r>
+              <a:rPr lang="en-US" sz="2800" dirty="0" smtClean="0">
+                <a:latin typeface="Georgia"/>
+                <a:cs typeface="Georgia"/>
+              </a:rPr>
+              <a:t>without any </a:t>
+            </a:r>
+            <a:r>
+              <a:rPr lang="en-US" sz="2800" dirty="0" smtClean="0">
+                <a:latin typeface="Georgia"/>
+                <a:cs typeface="Georgia"/>
+              </a:rPr>
+              <a:t>changes to the execution environment. In particular </a:t>
+            </a:r>
+            <a:r>
+              <a:rPr lang="en-US" sz="2800" dirty="0" smtClean="0">
+                <a:latin typeface="Georgia"/>
+                <a:cs typeface="Georgia"/>
+              </a:rPr>
+              <a:t>it can </a:t>
+            </a:r>
+            <a:r>
+              <a:rPr lang="en-US" sz="2800" dirty="0" smtClean="0">
+                <a:latin typeface="Georgia"/>
+                <a:cs typeface="Georgia"/>
+              </a:rPr>
+              <a:t>be used </a:t>
+            </a:r>
+            <a:r>
+              <a:rPr lang="en-US" sz="2800" dirty="0" smtClean="0">
+                <a:latin typeface="Georgia"/>
+                <a:cs typeface="Georgia"/>
+              </a:rPr>
+              <a:t>to support </a:t>
+            </a:r>
+            <a:r>
+              <a:rPr lang="en-US" sz="2800" dirty="0" smtClean="0">
+                <a:latin typeface="Georgia"/>
+                <a:cs typeface="Georgia"/>
+              </a:rPr>
+              <a:t>specific application usage patterns, for example</a:t>
+            </a:r>
+            <a:r>
+              <a:rPr lang="en-US" sz="2800" dirty="0" smtClean="0">
+                <a:latin typeface="Georgia"/>
+                <a:cs typeface="Georgia"/>
+              </a:rPr>
+              <a:t>, it </a:t>
+            </a:r>
+            <a:r>
+              <a:rPr lang="en-US" sz="2800" dirty="0" smtClean="0">
+                <a:latin typeface="Georgia"/>
+                <a:cs typeface="Georgia"/>
+              </a:rPr>
+              <a:t>has been used for distributed replica-exchange simulations using </a:t>
+            </a:r>
+            <a:r>
+              <a:rPr lang="en-US" sz="2800" dirty="0" smtClean="0">
+                <a:latin typeface="Georgia"/>
+                <a:cs typeface="Georgia"/>
+              </a:rPr>
+              <a:t>NAMD.</a:t>
+            </a:r>
+          </a:p>
+          <a:p>
+            <a:pPr marL="457200" indent="-457200" algn="just">
+              <a:lnSpc>
+                <a:spcPct val="130000"/>
+              </a:lnSpc>
+              <a:spcAft>
+                <a:spcPts val="1800"/>
+              </a:spcAft>
+              <a:buFont typeface="Courier New"/>
+              <a:buChar char="o"/>
+            </a:pPr>
+            <a:r>
+              <a:rPr lang="en-US" sz="2800" dirty="0" smtClean="0">
+                <a:latin typeface="Georgia"/>
+                <a:cs typeface="Georgia"/>
+              </a:rPr>
+              <a:t>SAGA </a:t>
+            </a:r>
+            <a:r>
+              <a:rPr lang="en-US" sz="2800" dirty="0" smtClean="0">
+                <a:latin typeface="Georgia"/>
+                <a:cs typeface="Georgia"/>
+              </a:rPr>
+              <a:t>will be the interfaced with Cactus applications to </a:t>
+            </a:r>
+            <a:r>
+              <a:rPr lang="en-US" sz="2800" dirty="0" smtClean="0">
+                <a:latin typeface="Georgia"/>
+                <a:cs typeface="Georgia"/>
+              </a:rPr>
+              <a:t>use Information </a:t>
+            </a:r>
+            <a:r>
+              <a:rPr lang="en-US" sz="2800" dirty="0" smtClean="0">
+                <a:latin typeface="Georgia"/>
+                <a:cs typeface="Georgia"/>
+              </a:rPr>
+              <a:t>Services and other advanced </a:t>
+            </a:r>
+            <a:r>
+              <a:rPr lang="en-US" sz="2800" dirty="0" err="1" smtClean="0">
+                <a:latin typeface="Georgia"/>
+                <a:cs typeface="Georgia"/>
+              </a:rPr>
+              <a:t>CyberInfrastructure</a:t>
+            </a:r>
+            <a:r>
+              <a:rPr lang="en-US" sz="2800" dirty="0" smtClean="0">
+                <a:latin typeface="Georgia"/>
+                <a:cs typeface="Georgia"/>
+              </a:rPr>
+              <a:t> features</a:t>
+            </a:r>
+            <a:r>
+              <a:rPr lang="en-US" sz="2800" dirty="0" smtClean="0">
+                <a:latin typeface="Georgia"/>
+                <a:cs typeface="Georgia"/>
+              </a:rPr>
+              <a:t>.</a:t>
+            </a:r>
+          </a:p>
+          <a:p>
+            <a:pPr marL="457200" indent="-457200" algn="just">
+              <a:lnSpc>
+                <a:spcPct val="130000"/>
+              </a:lnSpc>
+              <a:spcAft>
+                <a:spcPts val="1800"/>
+              </a:spcAft>
+              <a:buFont typeface="Courier New"/>
+              <a:buChar char="o"/>
+            </a:pPr>
+            <a:r>
+              <a:rPr lang="en-US" sz="2800" dirty="0" smtClean="0">
+                <a:latin typeface="Georgia"/>
+                <a:cs typeface="Georgia"/>
+              </a:rPr>
+              <a:t>SAGA </a:t>
+            </a:r>
+            <a:r>
+              <a:rPr lang="en-US" sz="2800" dirty="0" smtClean="0">
+                <a:latin typeface="Georgia"/>
+                <a:cs typeface="Georgia"/>
+              </a:rPr>
+              <a:t>will also provide the basic capability for interfacing multi-</a:t>
+            </a:r>
+            <a:r>
+              <a:rPr lang="en-US" sz="2800" dirty="0" smtClean="0">
+                <a:latin typeface="Georgia"/>
+                <a:cs typeface="Georgia"/>
+              </a:rPr>
+              <a:t>physics applications </a:t>
+            </a:r>
+            <a:r>
+              <a:rPr lang="en-US" sz="2800" dirty="0" smtClean="0">
+                <a:latin typeface="Georgia"/>
+                <a:cs typeface="Georgia"/>
+              </a:rPr>
+              <a:t>(via extension to the API to </a:t>
+            </a:r>
+            <a:r>
+              <a:rPr lang="en-US" sz="2800" dirty="0" smtClean="0">
+                <a:latin typeface="Georgia"/>
+                <a:cs typeface="Georgia"/>
+              </a:rPr>
+              <a:t>support messaging)</a:t>
+            </a:r>
+            <a:endParaRPr lang="en-US" sz="2800" dirty="0" smtClean="0">
+              <a:latin typeface="Georgia"/>
+              <a:cs typeface="Georgia"/>
+            </a:endParaRPr>
+          </a:p>
+        </p:txBody>
+      </p:sp>
+      <p:pic>
+        <p:nvPicPr>
+          <p:cNvPr id="23" name="Picture 22" descr="bigpicture_01.pdf"/>
+          <p:cNvPicPr>
+            <a:picLocks noChangeAspect="1"/>
+          </p:cNvPicPr>
+          <p:nvPr/>
+        </p:nvPicPr>
+        <mc:AlternateContent>
+          <mc:Choice xmlns:ma="http://schemas.microsoft.com/office/mac/drawingml/2008/main" Requires="ma">
+            <p:blipFill>
+              <a:blip r:embed="rId5"/>
+              <a:srcRect l="2267" t="4522" r="2178" b="6562"/>
+              <a:stretch>
+                <a:fillRect/>
+              </a:stretch>
+            </p:blipFill>
+          </mc:Choice>
+          <mc:Fallback>
+            <p:blipFill>
+              <a:blip r:embed="rId6"/>
+              <a:srcRect l="2267" t="4522" r="2178" b="6562"/>
+              <a:stretch>
+                <a:fillRect/>
+              </a:stretch>
+            </p:blipFill>
+          </mc:Fallback>
+        </mc:AlternateContent>
+        <p:spPr>
+          <a:xfrm>
+            <a:off x="15392400" y="10515600"/>
+            <a:ext cx="13106400" cy="6858000"/>
+          </a:xfrm>
+          <a:prstGeom prst="rect">
+            <a:avLst/>
+          </a:prstGeom>
+        </p:spPr>
+      </p:pic>
+      <p:pic>
+        <p:nvPicPr>
+          <p:cNvPr id="24" name="Picture 23" descr="bigpicture_02.pdf"/>
+          <p:cNvPicPr>
+            <a:picLocks noChangeAspect="1"/>
+          </p:cNvPicPr>
+          <p:nvPr/>
+        </p:nvPicPr>
+        <mc:AlternateContent>
+          <mc:Choice xmlns:ma="http://schemas.microsoft.com/office/mac/drawingml/2008/main" Requires="ma">
+            <p:blipFill>
+              <a:blip r:embed="rId7"/>
+              <a:srcRect l="2267" t="4073" r="2178" b="6682"/>
+              <a:stretch>
+                <a:fillRect/>
+              </a:stretch>
+            </p:blipFill>
+          </mc:Choice>
+          <mc:Fallback>
+            <p:blipFill>
+              <a:blip r:embed="rId8"/>
+              <a:srcRect l="2267" t="4073" r="2178" b="6682"/>
+              <a:stretch>
+                <a:fillRect/>
+              </a:stretch>
+            </p:blipFill>
+          </mc:Fallback>
+        </mc:AlternateContent>
+        <p:spPr>
+          <a:xfrm>
+            <a:off x="1663596" y="21706267"/>
+            <a:ext cx="13098921" cy="6879467"/>
+          </a:xfrm>
+          <a:prstGeom prst="rect">
+            <a:avLst/>
+          </a:prstGeom>
+        </p:spPr>
+      </p:pic>
+      <p:sp>
+        <p:nvSpPr>
+          <p:cNvPr id="25" name="TextBox 24"/>
+          <p:cNvSpPr txBox="1"/>
+          <p:nvPr/>
+        </p:nvSpPr>
+        <p:spPr>
+          <a:xfrm>
+            <a:off x="15081478" y="20726401"/>
+            <a:ext cx="13716000" cy="3010055"/>
+          </a:xfrm>
+          <a:prstGeom prst="rect">
+            <a:avLst/>
+          </a:prstGeom>
+          <a:noFill/>
+        </p:spPr>
+        <p:txBody>
+          <a:bodyPr wrap="square" lIns="274320" rIns="274320" bIns="548640" rtlCol="0">
+            <a:spAutoFit/>
+          </a:bodyPr>
+          <a:lstStyle/>
+          <a:p>
+            <a:pPr algn="ctr">
+              <a:lnSpc>
+                <a:spcPct val="130000"/>
+              </a:lnSpc>
+              <a:spcAft>
+                <a:spcPts val="1800"/>
+              </a:spcAft>
+            </a:pPr>
+            <a:r>
+              <a:rPr lang="en-US" sz="5400" b="1" dirty="0" smtClean="0">
+                <a:solidFill>
+                  <a:srgbClr val="000099"/>
+                </a:solidFill>
+              </a:rPr>
+              <a:t>Simple, yet Powerful</a:t>
+            </a:r>
+          </a:p>
+          <a:p>
+            <a:pPr algn="just">
+              <a:lnSpc>
+                <a:spcPct val="130000"/>
+              </a:lnSpc>
+              <a:spcAft>
+                <a:spcPts val="1800"/>
+              </a:spcAft>
+            </a:pPr>
+            <a:r>
+              <a:rPr lang="en-US" sz="2800" dirty="0" smtClean="0">
+                <a:latin typeface="Georgia"/>
+                <a:cs typeface="Georgia"/>
+              </a:rPr>
+              <a:t>Mention important packages and functionality supported. Mention extensions being developed</a:t>
+            </a:r>
+            <a:endParaRPr lang="en-US" sz="2800" dirty="0"/>
           </a:p>
         </p:txBody>
       </p:sp>

</xml_diff>

<commit_message>
changes, taking to completion
git-svn-id: file://localhost/tmp/svn2git/svn@243 defb5e50-622e-49ec-a68e-d72c7db87b45
</commit_message>
<xml_diff>
--- a/papers/cybertools08_poster/poster.pptx
+++ b/papers/cybertools08_poster/poster.pptx
@@ -4066,22 +4066,7 @@
                 <a:latin typeface="Tahoma"/>
                 <a:cs typeface="Tahoma"/>
               </a:rPr>
-              <a:t>Enabling Distributed Applications with </a:t>
-            </a:r>
-            <a:r>
-              <a:rPr lang="en-US" altLang="zh-TW" sz="8800" b="1" dirty="0" smtClean="0">
-                <a:solidFill>
-                  <a:srgbClr val="FFFFFF"/>
-                </a:solidFill>
-                <a:effectLst>
-                  <a:outerShdw blurRad="38100" dist="38100" dir="2700000" algn="tl">
-                    <a:srgbClr val="000000"/>
-                  </a:outerShdw>
-                </a:effectLst>
-                <a:latin typeface="Tahoma"/>
-                <a:cs typeface="Tahoma"/>
-              </a:rPr>
-              <a:t>SAGA</a:t>
+              <a:t>Enabling Distributed Applications with SAGA</a:t>
             </a:r>
             <a:r>
               <a:rPr lang="en-US" altLang="zh-TW" sz="8800" dirty="0" smtClean="0">
@@ -4320,22 +4305,7 @@
                 <a:latin typeface="Tahoma"/>
                 <a:cs typeface="Tahoma"/>
               </a:rPr>
-              <a:t>, and Ole </a:t>
-            </a:r>
-            <a:r>
-              <a:rPr lang="en-US" altLang="zh-TW" sz="4800" b="1" dirty="0" smtClean="0">
-                <a:solidFill>
-                  <a:schemeClr val="bg1"/>
-                </a:solidFill>
-                <a:effectLst>
-                  <a:outerShdw blurRad="38100" dist="38100" dir="2700000" algn="tl">
-                    <a:srgbClr val="000000"/>
-                  </a:outerShdw>
-                </a:effectLst>
-                <a:latin typeface="Tahoma"/>
-                <a:cs typeface="Tahoma"/>
-              </a:rPr>
-              <a:t>Weidner</a:t>
+              <a:t>, and Ole Weidner</a:t>
             </a:r>
             <a:r>
               <a:rPr lang="en-US" altLang="zh-TW" sz="1400" dirty="0" smtClean="0">
@@ -4369,37 +4339,7 @@
                 <a:latin typeface="Tahoma"/>
                 <a:cs typeface="Tahoma"/>
               </a:rPr>
-              <a:t>Center </a:t>
-            </a:r>
-            <a:r>
-              <a:rPr lang="en-US" altLang="zh-TW" sz="3600" b="1" dirty="0" smtClean="0">
-                <a:solidFill>
-                  <a:schemeClr val="bg1"/>
-                </a:solidFill>
-                <a:effectLst>
-                  <a:outerShdw blurRad="38100" dist="38100" dir="2700000" algn="tl">
-                    <a:srgbClr val="000000"/>
-                  </a:outerShdw>
-                </a:effectLst>
-                <a:latin typeface="Tahoma"/>
-                <a:cs typeface="Tahoma"/>
-              </a:rPr>
-              <a:t>for Computation &amp; Technology, Louisiana State University, Baton Rouge, U.S.A</a:t>
-            </a:r>
-            <a:r>
-              <a:rPr lang="en-US" altLang="zh-TW" sz="3600" b="1" dirty="0" smtClean="0">
-                <a:solidFill>
-                  <a:schemeClr val="bg1"/>
-                </a:solidFill>
-                <a:effectLst>
-                  <a:outerShdw blurRad="38100" dist="38100" dir="2700000" algn="tl">
-                    <a:srgbClr val="000000"/>
-                  </a:outerShdw>
-                </a:effectLst>
-                <a:latin typeface="Tahoma"/>
-                <a:cs typeface="Tahoma"/>
-              </a:rPr>
-              <a:t>.</a:t>
+              <a:t>Center for Computation &amp; Technology, Louisiana State University, Baton Rouge, U.S.A.</a:t>
             </a:r>
             <a:endParaRPr lang="en-US" altLang="zh-TW" sz="5500" dirty="0" smtClean="0">
               <a:latin typeface="Tahoma"/>
@@ -4881,7 +4821,7 @@
       </p:sp>
       <p:sp>
         <p:nvSpPr>
-          <p:cNvPr id="19" name="AutoShape 1627"/>
+          <p:cNvPr id="20" name="AutoShape 1627"/>
           <p:cNvSpPr>
             <a:spLocks noChangeArrowheads="1"/>
           </p:cNvSpPr>
@@ -4889,128 +4829,7 @@
         </p:nvSpPr>
         <p:spPr bwMode="auto">
           <a:xfrm>
-            <a:off x="15081478" y="4968870"/>
-            <a:ext cx="13716000" cy="4205406"/>
-          </a:xfrm>
-          <a:prstGeom prst="roundRect">
-            <a:avLst>
-              <a:gd name="adj" fmla="val 16667"/>
-            </a:avLst>
-          </a:prstGeom>
-          <a:solidFill>
-            <a:srgbClr val="FFFFFF"/>
-          </a:solidFill>
-          <a:ln w="76200">
-            <a:solidFill>
-              <a:srgbClr val="000099"/>
-            </a:solidFill>
-            <a:round/>
-            <a:headEnd/>
-            <a:tailEnd/>
-          </a:ln>
-        </p:spPr>
-        <p:txBody>
-          <a:bodyPr wrap="square" lIns="274320" rIns="274320" bIns="548640" anchor="t">
-            <a:spAutoFit/>
-          </a:bodyPr>
-          <a:lstStyle/>
-          <a:p>
-            <a:pPr algn="ctr">
-              <a:lnSpc>
-                <a:spcPct val="130000"/>
-              </a:lnSpc>
-              <a:spcAft>
-                <a:spcPts val="1800"/>
-              </a:spcAft>
-            </a:pPr>
-            <a:r>
-              <a:rPr lang="en-US" sz="5400" b="1" dirty="0" smtClean="0">
-                <a:solidFill>
-                  <a:srgbClr val="000099"/>
-                </a:solidFill>
-                <a:latin typeface="Tahoma"/>
-                <a:cs typeface="Tahoma"/>
-              </a:rPr>
-              <a:t>Exa</a:t>
-            </a:r>
-            <a:r>
-              <a:rPr lang="en-US" sz="5400" b="1" dirty="0" smtClean="0">
-                <a:solidFill>
-                  <a:srgbClr val="000099"/>
-                </a:solidFill>
-                <a:latin typeface="Tahoma"/>
-                <a:cs typeface="Tahoma"/>
-              </a:rPr>
-              <a:t>mples</a:t>
-            </a:r>
-            <a:endParaRPr lang="en-US" sz="4000" b="1" dirty="0" smtClean="0">
-              <a:solidFill>
-                <a:srgbClr val="000099"/>
-              </a:solidFill>
-              <a:latin typeface="Tahoma"/>
-              <a:cs typeface="Tahoma"/>
-            </a:endParaRPr>
-          </a:p>
-          <a:p>
-            <a:pPr algn="just">
-              <a:lnSpc>
-                <a:spcPct val="130000"/>
-              </a:lnSpc>
-              <a:spcAft>
-                <a:spcPts val="1800"/>
-              </a:spcAft>
-            </a:pPr>
-            <a:r>
-              <a:rPr lang="en-US" sz="2800" dirty="0" smtClean="0">
-                <a:latin typeface="Georgia"/>
-                <a:cs typeface="Georgia"/>
-              </a:rPr>
-              <a:t>Blah, blah, blah</a:t>
-            </a:r>
-          </a:p>
-          <a:p>
-            <a:pPr algn="just">
-              <a:lnSpc>
-                <a:spcPct val="130000"/>
-              </a:lnSpc>
-              <a:spcAft>
-                <a:spcPts val="1800"/>
-              </a:spcAft>
-            </a:pPr>
-            <a:r>
-              <a:rPr lang="en-US" sz="2800" dirty="0" smtClean="0">
-                <a:latin typeface="Georgia"/>
-                <a:cs typeface="Georgia"/>
-              </a:rPr>
-              <a:t>Blah, blah, blah</a:t>
-            </a:r>
-            <a:br>
-              <a:rPr lang="en-US" sz="2800" dirty="0" smtClean="0">
-                <a:latin typeface="Georgia"/>
-                <a:cs typeface="Georgia"/>
-              </a:rPr>
-            </a:br>
-            <a:r>
-              <a:rPr lang="en-US" sz="2800" dirty="0" smtClean="0">
-                <a:latin typeface="Georgia"/>
-                <a:cs typeface="Georgia"/>
-              </a:rPr>
-              <a:t>blah blah blah</a:t>
-            </a:r>
-          </a:p>
-        </p:txBody>
-      </p:sp>
-      <p:sp>
-        <p:nvSpPr>
-          <p:cNvPr id="20" name="AutoShape 1627"/>
-          <p:cNvSpPr>
-            <a:spLocks noChangeArrowheads="1"/>
-          </p:cNvSpPr>
-          <p:nvPr/>
-        </p:nvSpPr>
-        <p:spPr bwMode="auto">
-          <a:xfrm>
-            <a:off x="29265568" y="24740449"/>
+            <a:off x="29265568" y="24612600"/>
             <a:ext cx="13716000" cy="4825151"/>
           </a:xfrm>
           <a:prstGeom prst="roundRect">
@@ -5247,10 +5066,6 @@
               </a:rPr>
               <a:t>This work was supported by NSF and the Louisiana Board-of-Regents.</a:t>
             </a:r>
-            <a:endParaRPr lang="en-US" sz="2800" dirty="0" smtClean="0">
-              <a:latin typeface="Georgia"/>
-              <a:cs typeface="Georgia"/>
-            </a:endParaRPr>
           </a:p>
         </p:txBody>
       </p:sp>
@@ -5264,8 +5079,8 @@
         </p:nvSpPr>
         <p:spPr bwMode="auto">
           <a:xfrm>
-            <a:off x="29265568" y="15240000"/>
-            <a:ext cx="13716000" cy="9054392"/>
+            <a:off x="29265568" y="13106400"/>
+            <a:ext cx="13716000" cy="10293881"/>
           </a:xfrm>
           <a:prstGeom prst="roundRect">
             <a:avLst>
@@ -5354,14 +5169,7 @@
                 <a:latin typeface="Georgia"/>
                 <a:cs typeface="Georgia"/>
               </a:rPr>
-              <a:t> project in several critical ways</a:t>
-            </a:r>
-            <a:r>
-              <a:rPr lang="en-US" sz="2800" dirty="0" smtClean="0">
-                <a:latin typeface="Georgia"/>
-                <a:cs typeface="Georgia"/>
-              </a:rPr>
-              <a:t>:</a:t>
+              <a:t> project in several critical ways:</a:t>
             </a:r>
           </a:p>
           <a:p>
@@ -5380,92 +5188,47 @@
                 <a:latin typeface="Georgia"/>
                 <a:cs typeface="Georgia"/>
               </a:rPr>
-              <a:t>It </a:t>
+              <a:t>It is being used to create a general purpose "Application Manager", that will enable many science drivers to utilize remote LONI machines without any changes to the execution environment. In particular it can be used to support specific application usage patterns, for example, it has been used for distributed replica</a:t>
+            </a:r>
+            <a:r>
+              <a:rPr lang="en-US" sz="2800" smtClean="0">
+                <a:latin typeface="Georgia"/>
+                <a:cs typeface="Georgia"/>
+              </a:rPr>
+              <a:t>-</a:t>
+            </a:r>
+            <a:r>
+              <a:rPr lang="en-US" sz="2800" smtClean="0">
+                <a:latin typeface="Georgia"/>
+                <a:cs typeface="Georgia"/>
+              </a:rPr>
+              <a:t>exchange (RE) </a:t>
             </a:r>
             <a:r>
               <a:rPr lang="en-US" sz="2800" dirty="0" smtClean="0">
                 <a:latin typeface="Georgia"/>
                 <a:cs typeface="Georgia"/>
               </a:rPr>
-              <a:t>is being used to create a general purpose "Application Manager", </a:t>
+              <a:t>simulations using NAMD</a:t>
             </a:r>
             <a:r>
               <a:rPr lang="en-US" sz="2800" dirty="0" smtClean="0">
                 <a:latin typeface="Georgia"/>
                 <a:cs typeface="Georgia"/>
               </a:rPr>
-              <a:t>that will </a:t>
+              <a:t>. The same  infrastructure can be </a:t>
             </a:r>
             <a:r>
               <a:rPr lang="en-US" sz="2800" dirty="0" smtClean="0">
                 <a:latin typeface="Georgia"/>
                 <a:cs typeface="Georgia"/>
               </a:rPr>
-              <a:t>enable many science drivers to utilize remote LONI machines </a:t>
-            </a:r>
-            <a:r>
-              <a:rPr lang="en-US" sz="2800" dirty="0" smtClean="0">
-                <a:latin typeface="Georgia"/>
-                <a:cs typeface="Georgia"/>
-              </a:rPr>
-              <a:t>without any </a:t>
-            </a:r>
-            <a:r>
-              <a:rPr lang="en-US" sz="2800" dirty="0" smtClean="0">
-                <a:latin typeface="Georgia"/>
-                <a:cs typeface="Georgia"/>
-              </a:rPr>
-              <a:t>changes to the execution environment. In particular </a:t>
-            </a:r>
-            <a:r>
-              <a:rPr lang="en-US" sz="2800" dirty="0" smtClean="0">
-                <a:latin typeface="Georgia"/>
-                <a:cs typeface="Georgia"/>
-              </a:rPr>
-              <a:t>it can </a:t>
-            </a:r>
-            <a:r>
-              <a:rPr lang="en-US" sz="2800" dirty="0" smtClean="0">
-                <a:latin typeface="Georgia"/>
-                <a:cs typeface="Georgia"/>
-              </a:rPr>
-              <a:t>be used </a:t>
-            </a:r>
-            <a:r>
-              <a:rPr lang="en-US" sz="2800" dirty="0" smtClean="0">
-                <a:latin typeface="Georgia"/>
-                <a:cs typeface="Georgia"/>
-              </a:rPr>
-              <a:t>to support </a:t>
-            </a:r>
-            <a:r>
-              <a:rPr lang="en-US" sz="2800" dirty="0" smtClean="0">
-                <a:latin typeface="Georgia"/>
-                <a:cs typeface="Georgia"/>
-              </a:rPr>
-              <a:t>specific application usage patterns, for example</a:t>
-            </a:r>
-            <a:r>
-              <a:rPr lang="en-US" sz="2800" dirty="0" smtClean="0">
-                <a:latin typeface="Georgia"/>
-                <a:cs typeface="Georgia"/>
-              </a:rPr>
-              <a:t>, it </a:t>
-            </a:r>
-            <a:r>
-              <a:rPr lang="en-US" sz="2800" dirty="0" smtClean="0">
-                <a:latin typeface="Georgia"/>
-                <a:cs typeface="Georgia"/>
-              </a:rPr>
-              <a:t>has been used for distributed replica-exchange simulations using </a:t>
-            </a:r>
-            <a:r>
-              <a:rPr lang="en-US" sz="2800" dirty="0" smtClean="0">
-                <a:latin typeface="Georgia"/>
-                <a:cs typeface="Georgia"/>
-              </a:rPr>
-              <a:t>NAMD.</a:t>
-            </a:r>
+              <a:t>used for use with other codes such as LAMMPS, etc. The figure above provides  details on how SAGA is used to implement RE.</a:t>
+            </a:r>
+            <a:endParaRPr lang="en-US" sz="2800" dirty="0" smtClean="0">
+              <a:latin typeface="Georgia"/>
+              <a:cs typeface="Georgia"/>
+            </a:endParaRPr>
           </a:p>
           <a:p>
             <a:pPr marL="457200" indent="-457200" algn="just">
@@ -5483,28 +5246,14 @@
                 <a:latin typeface="Georgia"/>
                 <a:cs typeface="Georgia"/>
               </a:rPr>
-              <a:t>SAGA </a:t>
+              <a:t> SAGA </a:t>
             </a:r>
             <a:r>
               <a:rPr lang="en-US" sz="2800" dirty="0" smtClean="0">
                 <a:latin typeface="Georgia"/>
                 <a:cs typeface="Georgia"/>
               </a:rPr>
-              <a:t>will be the interfaced with Cactus applications to </a:t>
-            </a:r>
-            <a:r>
-              <a:rPr lang="en-US" sz="2800" dirty="0" smtClean="0">
-                <a:latin typeface="Georgia"/>
-                <a:cs typeface="Georgia"/>
-              </a:rPr>
-              <a:t>use Information </a:t>
-            </a:r>
-            <a:r>
-              <a:rPr lang="en-US" sz="2800" dirty="0" smtClean="0">
-                <a:latin typeface="Georgia"/>
-                <a:cs typeface="Georgia"/>
-              </a:rPr>
-              <a:t>Services and other advanced </a:t>
+              <a:t>will be the interfaced with Cactus applications to use Information Services and other advanced </a:t>
             </a:r>
             <a:r>
               <a:rPr lang="en-US" sz="2800" dirty="0" err="1" smtClean="0">
@@ -5518,14 +5267,7 @@
                 <a:latin typeface="Georgia"/>
                 <a:cs typeface="Georgia"/>
               </a:rPr>
-              <a:t> features</a:t>
-            </a:r>
-            <a:r>
-              <a:rPr lang="en-US" sz="2800" dirty="0" smtClean="0">
-                <a:latin typeface="Georgia"/>
-                <a:cs typeface="Georgia"/>
-              </a:rPr>
-              <a:t>.</a:t>
+              <a:t> features.</a:t>
             </a:r>
           </a:p>
           <a:p>
@@ -5544,40 +5286,8 @@
                 <a:latin typeface="Georgia"/>
                 <a:cs typeface="Georgia"/>
               </a:rPr>
-              <a:t>SAGA </a:t>
-            </a:r>
-            <a:r>
-              <a:rPr lang="en-US" sz="2800" dirty="0" smtClean="0">
-                <a:latin typeface="Georgia"/>
-                <a:cs typeface="Georgia"/>
-              </a:rPr>
-              <a:t>will also provide the basic capability for interfacing multi-</a:t>
-            </a:r>
-            <a:r>
-              <a:rPr lang="en-US" sz="2800" dirty="0" smtClean="0">
-                <a:latin typeface="Georgia"/>
-                <a:cs typeface="Georgia"/>
-              </a:rPr>
-              <a:t>physics applications </a:t>
-            </a:r>
-            <a:r>
-              <a:rPr lang="en-US" sz="2800" dirty="0" smtClean="0">
-                <a:latin typeface="Georgia"/>
-                <a:cs typeface="Georgia"/>
-              </a:rPr>
-              <a:t>(via extension to the API to </a:t>
-            </a:r>
-            <a:r>
-              <a:rPr lang="en-US" sz="2800" dirty="0" smtClean="0">
-                <a:latin typeface="Georgia"/>
-                <a:cs typeface="Georgia"/>
-              </a:rPr>
-              <a:t>support messaging)</a:t>
-            </a:r>
-            <a:endParaRPr lang="en-US" sz="2800" dirty="0" smtClean="0">
-              <a:latin typeface="Georgia"/>
-              <a:cs typeface="Georgia"/>
-            </a:endParaRPr>
+              <a:t>SAGA will also provide the basic capability for interfacing multi-physics applications (via extension to the API to support messaging)</a:t>
+            </a:r>
           </a:p>
         </p:txBody>
       </p:sp>
@@ -5611,7 +5321,7 @@
         </mc:AlternateContent>
         <p:spPr>
           <a:xfrm>
-            <a:off x="15392400" y="10515600"/>
+            <a:off x="15081478" y="21793200"/>
             <a:ext cx="13106400" cy="6858000"/>
           </a:xfrm>
           <a:prstGeom prst="rect">
@@ -5627,8 +5337,8 @@
           </p:cNvPicPr>
           <p:nvPr/>
         </p:nvPicPr>
-        <mc:AlternateContent>
-          <mc:Choice xmlns:ma="http://schemas.microsoft.com/office/mac/drawingml/2008/main" Requires="ma">
+        <mc:AlternateContent xmlns:ma="http://schemas.microsoft.com/office/mac/drawingml/2008/main">
+          <mc:Choice Requires="ma">
             <p:blipFill>
               <a:blip r:embed="rId7"/>
               <a:srcRect l="2267" t="4073" r="2178" b="6682"/>
@@ -5637,7 +5347,7 @@
               </a:stretch>
             </p:blipFill>
           </mc:Choice>
-          <mc:Fallback>
+          <mc:Fallback xmlns:p="http://schemas.openxmlformats.org/presentationml/2006/main" xmlns:mv="urn:schemas-microsoft-com:mac:vml" xmlns:mc="http://schemas.openxmlformats.org/markup-compatibility/2006" xmlns:r="http://schemas.openxmlformats.org/officeDocument/2006/relationships" xmlns:a="http://schemas.openxmlformats.org/drawingml/2006/main" xmlns="">
             <p:blipFill>
               <a:blip r:embed="rId8"/>
               <a:srcRect l="2267" t="4073" r="2178" b="6682"/>
@@ -5657,24 +5367,62 @@
           </a:prstGeom>
         </p:spPr>
       </p:pic>
-      <p:sp>
-        <p:nvSpPr>
-          <p:cNvPr id="25" name="TextBox 24"/>
-          <p:cNvSpPr txBox="1"/>
+      <p:pic>
+        <p:nvPicPr>
+          <p:cNvPr id="26" name="Picture 25" descr="remd_arch.jpg"/>
+          <p:cNvPicPr>
+            <a:picLocks noChangeAspect="1"/>
+          </p:cNvPicPr>
           <p:nvPr/>
-        </p:nvSpPr>
+        </p:nvPicPr>
+        <p:blipFill>
+          <a:blip r:embed="rId9"/>
+          <a:stretch>
+            <a:fillRect/>
+          </a:stretch>
+        </p:blipFill>
         <p:spPr>
           <a:xfrm>
-            <a:off x="15081478" y="20726401"/>
-            <a:ext cx="13716000" cy="3010055"/>
+            <a:off x="15631026" y="5029200"/>
+            <a:ext cx="24678774" cy="7356348"/>
           </a:xfrm>
           <a:prstGeom prst="rect">
             <a:avLst/>
           </a:prstGeom>
-          <a:noFill/>
         </p:spPr>
-        <p:txBody>
-          <a:bodyPr wrap="square" lIns="274320" rIns="274320" bIns="548640" rtlCol="0">
+      </p:pic>
+      <p:sp>
+        <p:nvSpPr>
+          <p:cNvPr id="27" name="AutoShape 1627"/>
+          <p:cNvSpPr>
+            <a:spLocks noChangeArrowheads="1"/>
+          </p:cNvSpPr>
+          <p:nvPr/>
+        </p:nvSpPr>
+        <p:spPr bwMode="auto">
+          <a:xfrm>
+            <a:off x="15621000" y="13335000"/>
+            <a:ext cx="13176478" cy="2710529"/>
+          </a:xfrm>
+          <a:prstGeom prst="roundRect">
+            <a:avLst>
+              <a:gd name="adj" fmla="val 16667"/>
+            </a:avLst>
+          </a:prstGeom>
+          <a:solidFill>
+            <a:srgbClr val="FFFFFF"/>
+          </a:solidFill>
+          <a:ln w="76200">
+            <a:solidFill>
+              <a:srgbClr val="000099"/>
+            </a:solidFill>
+            <a:round/>
+            <a:headEnd/>
+            <a:tailEnd/>
+          </a:ln>
+        </p:spPr>
+        <p:txBody>
+          <a:bodyPr wrap="square" lIns="274320" rIns="274320" bIns="548640" anchor="t">
             <a:spAutoFit/>
           </a:bodyPr>
           <a:lstStyle/>
@@ -5697,6 +5445,13 @@
               </a:rPr>
               <a:t>Simple, yet Powerful</a:t>
             </a:r>
+            <a:endParaRPr lang="en-US" sz="5400" b="1" dirty="0" smtClean="0">
+              <a:solidFill>
+                <a:srgbClr val="000099"/>
+              </a:solidFill>
+              <a:latin typeface="Tahoma"/>
+              <a:cs typeface="Tahoma"/>
+            </a:endParaRPr>
           </a:p>
           <a:p>
             <a:pPr algn="just">
@@ -5708,13 +5463,23 @@
               </a:spcAft>
             </a:pPr>
             <a:r>
+              <a:rPr lang="en-US" sz="2800" dirty="0" err="1" smtClean="0">
+                <a:latin typeface="Georgia"/>
+                <a:cs typeface="Georgia"/>
+              </a:rPr>
+              <a:t>CyberInfrastucture</a:t>
+            </a:r>
+            <a:r>
               <a:rPr lang="en-US" sz="2800" dirty="0" smtClean="0">
                 <a:latin typeface="Georgia"/>
                 <a:cs typeface="Georgia"/>
               </a:rPr>
-              <a:t>Mention important packages and functionality supported. Mention extensions being developed</a:t>
-            </a:r>
-            <a:endParaRPr lang="en-US" sz="2800" dirty="0"/>
+              <a:t> is all about </a:t>
+            </a:r>
+            <a:endParaRPr lang="en-US" sz="2800" dirty="0" smtClean="0">
+              <a:latin typeface="Georgia"/>
+              <a:cs typeface="Georgia"/>
+            </a:endParaRPr>
           </a:p>
         </p:txBody>
       </p:sp>

</xml_diff>

<commit_message>
changes i had made earlier were erased.
   reimplementing those changes..



git-svn-id: file://localhost/tmp/svn2git/svn@244 defb5e50-622e-49ec-a68e-d72c7db87b45
</commit_message>
<xml_diff>
--- a/papers/cybertools08_poster/poster.pptx
+++ b/papers/cybertools08_poster/poster.pptx
@@ -4358,8 +4358,8 @@
         </p:nvSpPr>
         <p:spPr bwMode="auto">
           <a:xfrm>
-            <a:off x="897388" y="4968870"/>
-            <a:ext cx="13716000" cy="15343177"/>
+            <a:off x="838200" y="4968870"/>
+            <a:ext cx="13924317" cy="14865356"/>
           </a:xfrm>
           <a:prstGeom prst="roundRect">
             <a:avLst>
@@ -4441,8 +4441,26 @@
                 <a:latin typeface="Georgia"/>
                 <a:cs typeface="Georgia"/>
               </a:rPr>
-              <a:t>Our group has lead the SAGA effort, starting from the specification effort at the OGF to providing the first C++ implementation [2]. We are also developing several different novel applications, using SAGA to harness the power of distributed infrastructure.</a:t>
-            </a:r>
+              <a:t>Our group has lead the SAGA effort, starting from the specification effort at the </a:t>
+            </a:r>
+            <a:r>
+              <a:rPr lang="en-US" sz="2800" dirty="0" smtClean="0">
+                <a:latin typeface="Georgia"/>
+                <a:cs typeface="Georgia"/>
+              </a:rPr>
+              <a:t>OGF to </a:t>
+            </a:r>
+            <a:r>
+              <a:rPr lang="en-US" sz="2800" dirty="0" smtClean="0">
+                <a:latin typeface="Georgia"/>
+                <a:cs typeface="Georgia"/>
+              </a:rPr>
+              <a:t>providing the first C++ implementation [2]. We are also developing several different novel applications, using SAGA to harness the power of distributed infrastructure.</a:t>
+            </a:r>
+            <a:endParaRPr lang="en-US" sz="2800" dirty="0" smtClean="0">
+              <a:latin typeface="Georgia"/>
+              <a:cs typeface="Georgia"/>
+            </a:endParaRPr>
           </a:p>
           <a:p>
             <a:pPr algn="just">
@@ -4458,7 +4476,49 @@
                 <a:latin typeface="Georgia"/>
                 <a:cs typeface="Georgia"/>
               </a:rPr>
-              <a:t>From the vision we have for the project and also from our experience developing on top of it, we believe SAGA is truly an enabler in the development of Distributed Applications. Here we present different types of distributed applications being developed on top of SAGA. Namely, (</a:t>
+              <a:t>W</a:t>
+            </a:r>
+            <a:r>
+              <a:rPr lang="en-US" sz="2800" dirty="0" smtClean="0">
+                <a:latin typeface="Georgia"/>
+                <a:cs typeface="Georgia"/>
+              </a:rPr>
+              <a:t>e </a:t>
+            </a:r>
+            <a:r>
+              <a:rPr lang="en-US" sz="2800" dirty="0" smtClean="0">
+                <a:latin typeface="Georgia"/>
+                <a:cs typeface="Georgia"/>
+              </a:rPr>
+              <a:t>present different types of distributed applications being developed</a:t>
+            </a:r>
+            <a:r>
+              <a:rPr lang="en-US" sz="2800" dirty="0" smtClean="0">
+                <a:latin typeface="Georgia"/>
+                <a:cs typeface="Georgia"/>
+              </a:rPr>
+              <a:t> </a:t>
+            </a:r>
+            <a:r>
+              <a:rPr lang="en-US" sz="2800" dirty="0" smtClean="0">
+                <a:latin typeface="Georgia"/>
+                <a:cs typeface="Georgia"/>
+              </a:rPr>
+              <a:t>using</a:t>
+            </a:r>
+            <a:r>
+              <a:rPr lang="en-US" sz="2800" dirty="0" smtClean="0">
+                <a:latin typeface="Georgia"/>
+                <a:cs typeface="Georgia"/>
+              </a:rPr>
+              <a:t> SAGA</a:t>
+            </a:r>
+            <a:r>
+              <a:rPr lang="en-US" sz="2800" dirty="0" smtClean="0">
+                <a:latin typeface="Georgia"/>
+                <a:cs typeface="Georgia"/>
+              </a:rPr>
+              <a:t>. Namely, (</a:t>
             </a:r>
             <a:r>
               <a:rPr lang="en-US" sz="2800" dirty="0" err="1" smtClean="0">
@@ -4472,8 +4532,26 @@
                 <a:latin typeface="Georgia"/>
                 <a:cs typeface="Georgia"/>
               </a:rPr>
-              <a:t>) porting legacy applications to utilize distributed resources; (ii) development of applications based upon abstractions and frameworks that are themselves developed using SAGA; (iii) first principles applications, explicitly cognizant of the fact that they will operate in a distributed environment, where the application logic is coupled with the distributed logic. SAGA Supports all such development.</a:t>
-            </a:r>
+              <a:t>) porting legacy applications to utilize distributed resources; (ii) development of applications based upon abstractions and frameworks that are themselves developed using SAGA; (iii) first principles applications, explicitly cognizant of the fact that they will operate in a distributed environment, where the application logic is coupled with the distributed logic.</a:t>
+            </a:r>
+            <a:r>
+              <a:rPr lang="en-US" sz="2800" dirty="0" smtClean="0">
+                <a:latin typeface="Georgia"/>
+                <a:cs typeface="Georgia"/>
+              </a:rPr>
+              <a:t> SAGA supports the development of these applications and many others, thus providing a tool to develop a broad and general class of applications.</a:t>
+            </a:r>
+            <a:r>
+              <a:rPr lang="en-US" sz="2800" dirty="0" smtClean="0">
+                <a:latin typeface="Georgia"/>
+                <a:cs typeface="Georgia"/>
+              </a:rPr>
+              <a:t> </a:t>
+            </a:r>
+            <a:endParaRPr lang="en-US" sz="2800" dirty="0" smtClean="0">
+              <a:latin typeface="Georgia"/>
+              <a:cs typeface="Georgia"/>
+            </a:endParaRPr>
           </a:p>
         </p:txBody>
       </p:sp>
@@ -5188,17 +5266,10 @@
                 <a:latin typeface="Georgia"/>
                 <a:cs typeface="Georgia"/>
               </a:rPr>
-              <a:t>It is being used to create a general purpose "Application Manager", that will enable many science drivers to utilize remote LONI machines without any changes to the execution environment. In particular it can be used to support specific application usage patterns, for example, it has been used for distributed replica</a:t>
-            </a:r>
-            <a:r>
-              <a:rPr lang="en-US" sz="2800" smtClean="0">
-                <a:latin typeface="Georgia"/>
-                <a:cs typeface="Georgia"/>
-              </a:rPr>
-              <a:t>-</a:t>
-            </a:r>
-            <a:r>
-              <a:rPr lang="en-US" sz="2800" smtClean="0">
+              <a:t>It is being used to create a general purpose "Application Manager", that will enable many science drivers to utilize remote LONI machines without any changes to the execution environment. In particular it can be used to support specific application usage patterns, for example, it has been used for distributed replica-</a:t>
+            </a:r>
+            <a:r>
+              <a:rPr lang="en-US" sz="2800" dirty="0" smtClean="0">
                 <a:latin typeface="Georgia"/>
                 <a:cs typeface="Georgia"/>
               </a:rPr>

</xml_diff>

<commit_message>
finished the poster. it was getting unacceptably late.
   Joao: format the "Simple, Powerful Abstraction Layer" to
   be consistent with the rest. Then do the needful to get this
   printed.



git-svn-id: file://localhost/tmp/svn2git/svn@245 defb5e50-622e-49ec-a68e-d72c7db87b45
</commit_message>
<xml_diff>
--- a/papers/cybertools08_poster/poster.pptx
+++ b/papers/cybertools08_poster/poster.pptx
@@ -4441,21 +4441,7 @@
                 <a:latin typeface="Georgia"/>
                 <a:cs typeface="Georgia"/>
               </a:rPr>
-              <a:t>Our group has lead the SAGA effort, starting from the specification effort at the </a:t>
-            </a:r>
-            <a:r>
-              <a:rPr lang="en-US" sz="2800" dirty="0" smtClean="0">
-                <a:latin typeface="Georgia"/>
-                <a:cs typeface="Georgia"/>
-              </a:rPr>
-              <a:t>OGF to </a:t>
-            </a:r>
-            <a:r>
-              <a:rPr lang="en-US" sz="2800" dirty="0" smtClean="0">
-                <a:latin typeface="Georgia"/>
-                <a:cs typeface="Georgia"/>
-              </a:rPr>
-              <a:t>providing the first C++ implementation [2]. We are also developing several different novel applications, using SAGA to harness the power of distributed infrastructure.</a:t>
+              <a:t>Our group has lead the SAGA effort, starting from the specification effort at the OGF to providing the first C++ implementation [2]. We are also developing several different novel applications, using SAGA to harness the power of distributed infrastructure.</a:t>
             </a:r>
             <a:endParaRPr lang="en-US" sz="2800" dirty="0" smtClean="0">
               <a:latin typeface="Georgia"/>
@@ -4476,82 +4462,64 @@
                 <a:latin typeface="Georgia"/>
                 <a:cs typeface="Georgia"/>
               </a:rPr>
-              <a:t>W</a:t>
+              <a:t>SAGA has already been used to develop different </a:t>
             </a:r>
             <a:r>
               <a:rPr lang="en-US" sz="2800" dirty="0" smtClean="0">
                 <a:latin typeface="Georgia"/>
                 <a:cs typeface="Georgia"/>
               </a:rPr>
-              <a:t>e </a:t>
+              <a:t>types of distributed </a:t>
             </a:r>
             <a:r>
               <a:rPr lang="en-US" sz="2800" dirty="0" smtClean="0">
                 <a:latin typeface="Georgia"/>
                 <a:cs typeface="Georgia"/>
               </a:rPr>
-              <a:t>present different types of distributed applications being developed</a:t>
+              <a:t>applications. </a:t>
             </a:r>
             <a:r>
               <a:rPr lang="en-US" sz="2800" dirty="0" smtClean="0">
                 <a:latin typeface="Georgia"/>
                 <a:cs typeface="Georgia"/>
               </a:rPr>
-              <a:t> </a:t>
+              <a:t>Namely, (</a:t>
+            </a:r>
+            <a:r>
+              <a:rPr lang="en-US" sz="2800" dirty="0" err="1" smtClean="0">
+                <a:latin typeface="Georgia"/>
+                <a:cs typeface="Georgia"/>
+              </a:rPr>
+              <a:t>i</a:t>
             </a:r>
             <a:r>
               <a:rPr lang="en-US" sz="2800" dirty="0" smtClean="0">
                 <a:latin typeface="Georgia"/>
                 <a:cs typeface="Georgia"/>
               </a:rPr>
-              <a:t>using</a:t>
+              <a:t>)</a:t>
             </a:r>
             <a:r>
               <a:rPr lang="en-US" sz="2800" dirty="0" smtClean="0">
                 <a:latin typeface="Georgia"/>
                 <a:cs typeface="Georgia"/>
               </a:rPr>
-              <a:t> SAGA</a:t>
+              <a:t> converting </a:t>
             </a:r>
             <a:r>
               <a:rPr lang="en-US" sz="2800" dirty="0" smtClean="0">
                 <a:latin typeface="Georgia"/>
                 <a:cs typeface="Georgia"/>
               </a:rPr>
-              <a:t>. Namely, (</a:t>
-            </a:r>
-            <a:r>
-              <a:rPr lang="en-US" sz="2800" dirty="0" err="1" smtClean="0">
-                <a:latin typeface="Georgia"/>
-                <a:cs typeface="Georgia"/>
-              </a:rPr>
-              <a:t>i</a:t>
+              <a:t>legacy </a:t>
             </a:r>
             <a:r>
               <a:rPr lang="en-US" sz="2800" dirty="0" smtClean="0">
                 <a:latin typeface="Georgia"/>
                 <a:cs typeface="Georgia"/>
               </a:rPr>
-              <a:t>) porting legacy applications to utilize distributed resources; (ii) development of applications based upon abstractions and frameworks that are themselves developed using SAGA; (iii) first principles applications, explicitly cognizant of the fact that they will operate in a distributed environment, where the application logic is coupled with the distributed logic.</a:t>
-            </a:r>
-            <a:r>
-              <a:rPr lang="en-US" sz="2800" dirty="0" smtClean="0">
-                <a:latin typeface="Georgia"/>
-                <a:cs typeface="Georgia"/>
-              </a:rPr>
-              <a:t> SAGA supports the development of these applications and many others, thus providing a tool to develop a broad and general class of applications.</a:t>
-            </a:r>
-            <a:r>
-              <a:rPr lang="en-US" sz="2800" dirty="0" smtClean="0">
-                <a:latin typeface="Georgia"/>
-                <a:cs typeface="Georgia"/>
-              </a:rPr>
-              <a:t> </a:t>
-            </a:r>
-            <a:endParaRPr lang="en-US" sz="2800" dirty="0" smtClean="0">
-              <a:latin typeface="Georgia"/>
-              <a:cs typeface="Georgia"/>
-            </a:endParaRPr>
+              <a:t>applications to utilize distributed resources; (ii) development of applications based upon abstractions and frameworks that are themselves developed using SAGA; (iii) first principles applications, explicitly cognizant of the fact that they will operate in a distributed environment, where the application logic is coupled with the distributed logic. SAGA supports the development of these applications and many others, thus providing a tool to develop a broad and general class of applications. </a:t>
+            </a:r>
           </a:p>
         </p:txBody>
       </p:sp>
@@ -5142,8 +5110,54 @@
                 <a:latin typeface="Georgia"/>
                 <a:cs typeface="Georgia"/>
               </a:rPr>
-              <a:t>This work was supported by NSF and the Louisiana Board-of-Regents.</a:t>
-            </a:r>
+              <a:t>This work was supported by </a:t>
+            </a:r>
+            <a:r>
+              <a:rPr lang="en-US" sz="2800" dirty="0" smtClean="0">
+                <a:latin typeface="Georgia"/>
+                <a:cs typeface="Georgia"/>
+              </a:rPr>
+              <a:t>NSF</a:t>
+            </a:r>
+            <a:r>
+              <a:rPr lang="en-US" sz="2800" dirty="0" smtClean="0">
+                <a:latin typeface="Georgia"/>
+                <a:cs typeface="Georgia"/>
+              </a:rPr>
+              <a:t>, the </a:t>
+            </a:r>
+            <a:r>
+              <a:rPr lang="en-US" sz="2800" dirty="0" smtClean="0">
+                <a:latin typeface="Georgia"/>
+                <a:cs typeface="Georgia"/>
+              </a:rPr>
+              <a:t> </a:t>
+            </a:r>
+            <a:r>
+              <a:rPr lang="en-US" sz="2800" dirty="0" smtClean="0">
+                <a:latin typeface="Georgia"/>
+                <a:cs typeface="Georgia"/>
+              </a:rPr>
+              <a:t>Louisiana Board-of-</a:t>
+            </a:r>
+            <a:r>
+              <a:rPr lang="en-US" sz="2800" dirty="0" smtClean="0">
+                <a:latin typeface="Georgia"/>
+                <a:cs typeface="Georgia"/>
+              </a:rPr>
+              <a:t>Regents and CCT </a:t>
+            </a:r>
+            <a:r>
+              <a:rPr lang="en-US" sz="2800" dirty="0" smtClean="0">
+                <a:latin typeface="Georgia"/>
+                <a:cs typeface="Georgia"/>
+              </a:rPr>
+              <a:t>funds.</a:t>
+            </a:r>
+            <a:endParaRPr lang="en-US" sz="2800" dirty="0" smtClean="0">
+              <a:latin typeface="Georgia"/>
+              <a:cs typeface="Georgia"/>
+            </a:endParaRPr>
           </a:p>
         </p:txBody>
       </p:sp>
@@ -5266,40 +5280,8 @@
                 <a:latin typeface="Georgia"/>
                 <a:cs typeface="Georgia"/>
               </a:rPr>
-              <a:t>It is being used to create a general purpose "Application Manager", that will enable many science drivers to utilize remote LONI machines without any changes to the execution environment. In particular it can be used to support specific application usage patterns, for example, it has been used for distributed replica-</a:t>
-            </a:r>
-            <a:r>
-              <a:rPr lang="en-US" sz="2800" dirty="0" smtClean="0">
-                <a:latin typeface="Georgia"/>
-                <a:cs typeface="Georgia"/>
-              </a:rPr>
-              <a:t>exchange (RE) </a:t>
-            </a:r>
-            <a:r>
-              <a:rPr lang="en-US" sz="2800" dirty="0" smtClean="0">
-                <a:latin typeface="Georgia"/>
-                <a:cs typeface="Georgia"/>
-              </a:rPr>
-              <a:t>simulations using NAMD</a:t>
-            </a:r>
-            <a:r>
-              <a:rPr lang="en-US" sz="2800" dirty="0" smtClean="0">
-                <a:latin typeface="Georgia"/>
-                <a:cs typeface="Georgia"/>
-              </a:rPr>
-              <a:t>. The same  infrastructure can be </a:t>
-            </a:r>
-            <a:r>
-              <a:rPr lang="en-US" sz="2800" dirty="0" smtClean="0">
-                <a:latin typeface="Georgia"/>
-                <a:cs typeface="Georgia"/>
-              </a:rPr>
-              <a:t>used for use with other codes such as LAMMPS, etc. The figure above provides  details on how SAGA is used to implement RE.</a:t>
-            </a:r>
-            <a:endParaRPr lang="en-US" sz="2800" dirty="0" smtClean="0">
-              <a:latin typeface="Georgia"/>
-              <a:cs typeface="Georgia"/>
-            </a:endParaRPr>
+              <a:t>It is being used to create a general purpose "Application Manager", that will enable many science drivers to utilize remote LONI machines without any changes to the execution environment. In particular it can be used to support specific application usage patterns, for example, it has been used for distributed replica-exchange (RE) simulations using NAMD. The same  infrastructure can be used for use with other codes such as LAMMPS, etc. The figure above provides  details on how SAGA is used to implement RE.</a:t>
+            </a:r>
           </a:p>
           <a:p>
             <a:pPr marL="457200" indent="-457200" algn="just">
@@ -5317,14 +5299,7 @@
                 <a:latin typeface="Georgia"/>
                 <a:cs typeface="Georgia"/>
               </a:rPr>
-              <a:t> SAGA </a:t>
-            </a:r>
-            <a:r>
-              <a:rPr lang="en-US" sz="2800" dirty="0" smtClean="0">
-                <a:latin typeface="Georgia"/>
-                <a:cs typeface="Georgia"/>
-              </a:rPr>
-              <a:t>will be the interfaced with Cactus applications to use Information Services and other advanced </a:t>
+              <a:t> SAGA will be the interfaced with Cactus applications to use Information Services and other advanced </a:t>
             </a:r>
             <a:r>
               <a:rPr lang="en-US" sz="2800" dirty="0" err="1" smtClean="0">
@@ -5370,8 +5345,8 @@
           </p:cNvPicPr>
           <p:nvPr/>
         </p:nvPicPr>
-        <mc:AlternateContent>
-          <mc:Choice xmlns:ma="http://schemas.microsoft.com/office/mac/drawingml/2008/main" Requires="ma">
+        <mc:AlternateContent xmlns:ma="http://schemas.microsoft.com/office/mac/drawingml/2008/main">
+          <mc:Choice Requires="ma">
             <p:blipFill>
               <a:blip r:embed="rId5"/>
               <a:srcRect l="2267" t="4522" r="2178" b="6562"/>
@@ -5380,7 +5355,7 @@
               </a:stretch>
             </p:blipFill>
           </mc:Choice>
-          <mc:Fallback>
+          <mc:Fallback xmlns:p="http://schemas.openxmlformats.org/presentationml/2006/main" xmlns:mv="urn:schemas-microsoft-com:mac:vml" xmlns:mc="http://schemas.openxmlformats.org/markup-compatibility/2006" xmlns:r="http://schemas.openxmlformats.org/officeDocument/2006/relationships" xmlns:a="http://schemas.openxmlformats.org/drawingml/2006/main" xmlns="">
             <p:blipFill>
               <a:blip r:embed="rId6"/>
               <a:srcRect l="2267" t="4522" r="2178" b="6562"/>
@@ -5418,7 +5393,7 @@
               </a:stretch>
             </p:blipFill>
           </mc:Choice>
-          <mc:Fallback xmlns:p="http://schemas.openxmlformats.org/presentationml/2006/main" xmlns:mv="urn:schemas-microsoft-com:mac:vml" xmlns:mc="http://schemas.openxmlformats.org/markup-compatibility/2006" xmlns:r="http://schemas.openxmlformats.org/officeDocument/2006/relationships" xmlns:a="http://schemas.openxmlformats.org/drawingml/2006/main" xmlns="">
+          <mc:Fallback xmlns:ma="http://schemas.microsoft.com/office/mac/drawingml/2008/main" xmlns="" xmlns:a="http://schemas.openxmlformats.org/drawingml/2006/main" xmlns:r="http://schemas.openxmlformats.org/officeDocument/2006/relationships" xmlns:mc="http://schemas.openxmlformats.org/markup-compatibility/2006" xmlns:mv="urn:schemas-microsoft-com:mac:vml" xmlns:p="http://schemas.openxmlformats.org/presentationml/2006/main">
             <p:blipFill>
               <a:blip r:embed="rId8"/>
               <a:srcRect l="2267" t="4073" r="2178" b="6682"/>
@@ -5473,7 +5448,7 @@
         <p:spPr bwMode="auto">
           <a:xfrm>
             <a:off x="15621000" y="13335000"/>
-            <a:ext cx="13176478" cy="2710529"/>
+            <a:ext cx="13176478" cy="9394911"/>
           </a:xfrm>
           <a:prstGeom prst="roundRect">
             <a:avLst>
@@ -5507,25 +5482,48 @@
               </a:spcAft>
             </a:pPr>
             <a:r>
-              <a:rPr lang="en-US" sz="5400" b="1" dirty="0" smtClean="0">
+              <a:rPr lang="en-US" sz="4800" b="1" dirty="0" smtClean="0">
                 <a:solidFill>
                   <a:srgbClr val="000099"/>
                 </a:solidFill>
                 <a:latin typeface="Tahoma"/>
                 <a:cs typeface="Tahoma"/>
               </a:rPr>
-              <a:t>Simple, yet Powerful</a:t>
-            </a:r>
-            <a:endParaRPr lang="en-US" sz="5400" b="1" dirty="0" smtClean="0">
-              <a:solidFill>
-                <a:srgbClr val="000099"/>
-              </a:solidFill>
-              <a:latin typeface="Tahoma"/>
-              <a:cs typeface="Tahoma"/>
-            </a:endParaRPr>
-          </a:p>
-          <a:p>
-            <a:pPr algn="just">
+              <a:t>Simple, Powerful </a:t>
+            </a:r>
+            <a:r>
+              <a:rPr lang="en-US" sz="4800" b="1" dirty="0" err="1" smtClean="0">
+                <a:solidFill>
+                  <a:srgbClr val="000099"/>
+                </a:solidFill>
+                <a:latin typeface="Tahoma"/>
+                <a:cs typeface="Tahoma"/>
+              </a:rPr>
+              <a:t>Abstraction</a:t>
+            </a:r>
+            <a:r>
+              <a:rPr lang="en-US" sz="4800" b="1" dirty="0" smtClean="0">
+                <a:solidFill>
+                  <a:srgbClr val="000099"/>
+                </a:solidFill>
+                <a:latin typeface="Tahoma"/>
+                <a:cs typeface="Tahoma"/>
+              </a:rPr>
+              <a:t> </a:t>
+            </a:r>
+            <a:r>
+              <a:rPr lang="en-US" sz="4800" b="1" dirty="0" smtClean="0">
+                <a:solidFill>
+                  <a:srgbClr val="000099"/>
+                </a:solidFill>
+                <a:latin typeface="Tahoma"/>
+                <a:cs typeface="Tahoma"/>
+              </a:rPr>
+              <a:t>Layer</a:t>
+            </a:r>
+          </a:p>
+          <a:p>
+            <a:pPr algn="ctr">
               <a:lnSpc>
                 <a:spcPct val="130000"/>
               </a:lnSpc>
@@ -5534,22 +5532,101 @@
               </a:spcAft>
             </a:pPr>
             <a:r>
-              <a:rPr lang="en-US" sz="2800" dirty="0" err="1" smtClean="0">
-                <a:latin typeface="Georgia"/>
-                <a:cs typeface="Georgia"/>
-              </a:rPr>
-              <a:t>CyberInfrastucture</a:t>
-            </a:r>
-            <a:r>
-              <a:rPr lang="en-US" sz="2800" dirty="0" smtClean="0">
-                <a:latin typeface="Georgia"/>
-                <a:cs typeface="Georgia"/>
-              </a:rPr>
-              <a:t> is all about </a:t>
-            </a:r>
-            <a:endParaRPr lang="en-US" sz="2800" dirty="0" smtClean="0">
-              <a:latin typeface="Georgia"/>
-              <a:cs typeface="Georgia"/>
+              <a:rPr lang="en-US" sz="2800" b="1" dirty="0" smtClean="0">
+                <a:solidFill>
+                  <a:srgbClr val="000099"/>
+                </a:solidFill>
+                <a:latin typeface="Tahoma"/>
+                <a:cs typeface="Tahoma"/>
+              </a:rPr>
+              <a:t>SAGA </a:t>
+            </a:r>
+            <a:r>
+              <a:rPr lang="en-US" sz="2800" b="1" dirty="0" smtClean="0">
+                <a:solidFill>
+                  <a:srgbClr val="000099"/>
+                </a:solidFill>
+                <a:latin typeface="Tahoma"/>
+                <a:cs typeface="Tahoma"/>
+              </a:rPr>
+              <a:t>facilitates the use of distributed infrastructure by providing a simple interface across different middleware distributions and environments. Therefore once an application has been written using SAGA it can be deployed and run on any environment in which SAGA is supported. We are developing adaptors for the most commonly </a:t>
+            </a:r>
+            <a:r>
+              <a:rPr lang="en-US" sz="2800" b="1" dirty="0" err="1" smtClean="0">
+                <a:solidFill>
+                  <a:srgbClr val="000099"/>
+                </a:solidFill>
+                <a:latin typeface="Tahoma"/>
+                <a:cs typeface="Tahoma"/>
+              </a:rPr>
+              <a:t>occuring</a:t>
+            </a:r>
+            <a:r>
+              <a:rPr lang="en-US" sz="2800" b="1" dirty="0" smtClean="0">
+                <a:solidFill>
+                  <a:srgbClr val="000099"/>
+                </a:solidFill>
+                <a:latin typeface="Tahoma"/>
+                <a:cs typeface="Tahoma"/>
+              </a:rPr>
+              <a:t> distributed environments.  Additionally SAGA provides the  abstractions from which commonly occurring execution patterns and usage modes  can be supported. For example for data-intensive applications, we create a framework that supports the common </a:t>
+            </a:r>
+            <a:r>
+              <a:rPr lang="en-US" sz="2800" b="1" dirty="0" err="1" smtClean="0">
+                <a:solidFill>
+                  <a:srgbClr val="000099"/>
+                </a:solidFill>
+                <a:latin typeface="Tahoma"/>
+                <a:cs typeface="Tahoma"/>
+              </a:rPr>
+              <a:t>MapReduce</a:t>
+            </a:r>
+            <a:r>
+              <a:rPr lang="en-US" sz="2800" b="1" dirty="0" smtClean="0">
+                <a:solidFill>
+                  <a:srgbClr val="000099"/>
+                </a:solidFill>
+                <a:latin typeface="Tahoma"/>
+                <a:cs typeface="Tahoma"/>
+              </a:rPr>
+              <a:t> pattern. Applications involving basic functionality such as searching, </a:t>
+            </a:r>
+            <a:r>
+              <a:rPr lang="en-US" sz="2800" b="1" smtClean="0">
+                <a:solidFill>
+                  <a:srgbClr val="000099"/>
+                </a:solidFill>
+                <a:latin typeface="Tahoma"/>
+                <a:cs typeface="Tahoma"/>
+              </a:rPr>
+              <a:t>can then be </a:t>
+            </a:r>
+            <a:r>
+              <a:rPr lang="en-US" sz="2800" b="1" dirty="0" smtClean="0">
+                <a:solidFill>
+                  <a:srgbClr val="000099"/>
+                </a:solidFill>
+                <a:latin typeface="Tahoma"/>
+                <a:cs typeface="Tahoma"/>
+              </a:rPr>
+              <a:t>deployed over distributed </a:t>
+            </a:r>
+            <a:r>
+              <a:rPr lang="en-US" sz="2800" b="1" dirty="0" err="1" smtClean="0">
+                <a:solidFill>
+                  <a:srgbClr val="000099"/>
+                </a:solidFill>
+                <a:latin typeface="Tahoma"/>
+                <a:cs typeface="Tahoma"/>
+              </a:rPr>
+              <a:t>environements</a:t>
+            </a:r>
+            <a:endParaRPr lang="en-US" sz="2800" b="1" dirty="0" smtClean="0">
+              <a:solidFill>
+                <a:srgbClr val="000099"/>
+              </a:solidFill>
+              <a:latin typeface="Tahoma"/>
+              <a:cs typeface="Tahoma"/>
             </a:endParaRPr>
           </a:p>
         </p:txBody>

</xml_diff>